<commit_message>
Updated Scala  Notes till 4 Unit
</commit_message>
<xml_diff>
--- a/Scala upated.pptx
+++ b/Scala upated.pptx
@@ -143,10 +143,43 @@
     <p:sldId id="395" r:id="rId137"/>
     <p:sldId id="396" r:id="rId138"/>
     <p:sldId id="397" r:id="rId139"/>
-    <p:sldId id="398" r:id="rId140"/>
-    <p:sldId id="390" r:id="rId141"/>
-    <p:sldId id="391" r:id="rId142"/>
-    <p:sldId id="392" r:id="rId143"/>
+    <p:sldId id="422" r:id="rId140"/>
+    <p:sldId id="423" r:id="rId141"/>
+    <p:sldId id="424" r:id="rId142"/>
+    <p:sldId id="425" r:id="rId143"/>
+    <p:sldId id="426" r:id="rId144"/>
+    <p:sldId id="427" r:id="rId145"/>
+    <p:sldId id="428" r:id="rId146"/>
+    <p:sldId id="429" r:id="rId147"/>
+    <p:sldId id="430" r:id="rId148"/>
+    <p:sldId id="431" r:id="rId149"/>
+    <p:sldId id="405" r:id="rId150"/>
+    <p:sldId id="421" r:id="rId151"/>
+    <p:sldId id="398" r:id="rId152"/>
+    <p:sldId id="399" r:id="rId153"/>
+    <p:sldId id="400" r:id="rId154"/>
+    <p:sldId id="401" r:id="rId155"/>
+    <p:sldId id="402" r:id="rId156"/>
+    <p:sldId id="390" r:id="rId157"/>
+    <p:sldId id="391" r:id="rId158"/>
+    <p:sldId id="392" r:id="rId159"/>
+    <p:sldId id="403" r:id="rId160"/>
+    <p:sldId id="404" r:id="rId161"/>
+    <p:sldId id="406" r:id="rId162"/>
+    <p:sldId id="407" r:id="rId163"/>
+    <p:sldId id="408" r:id="rId164"/>
+    <p:sldId id="409" r:id="rId165"/>
+    <p:sldId id="410" r:id="rId166"/>
+    <p:sldId id="411" r:id="rId167"/>
+    <p:sldId id="412" r:id="rId168"/>
+    <p:sldId id="413" r:id="rId169"/>
+    <p:sldId id="414" r:id="rId170"/>
+    <p:sldId id="415" r:id="rId171"/>
+    <p:sldId id="416" r:id="rId172"/>
+    <p:sldId id="417" r:id="rId173"/>
+    <p:sldId id="418" r:id="rId174"/>
+    <p:sldId id="419" r:id="rId175"/>
+    <p:sldId id="420" r:id="rId176"/>
   </p:sldIdLst>
   <p:sldSz cx="9144000" cy="6858000" type="screen4x3"/>
   <p:notesSz cx="6858000" cy="9144000"/>
@@ -384,7 +417,7 @@
           <a:p>
             <a:fld id="{39864F90-5D3F-40B5-82AF-56546CCBA1CD}" type="datetimeFigureOut">
               <a:rPr lang="en-IN" smtClean="0"/>
-              <a:t>04-05-2022</a:t>
+              <a:t>13-05-2022</a:t>
             </a:fld>
             <a:endParaRPr lang="en-IN"/>
           </a:p>
@@ -554,7 +587,7 @@
           <a:p>
             <a:fld id="{39864F90-5D3F-40B5-82AF-56546CCBA1CD}" type="datetimeFigureOut">
               <a:rPr lang="en-IN" smtClean="0"/>
-              <a:t>04-05-2022</a:t>
+              <a:t>13-05-2022</a:t>
             </a:fld>
             <a:endParaRPr lang="en-IN"/>
           </a:p>
@@ -734,7 +767,7 @@
           <a:p>
             <a:fld id="{39864F90-5D3F-40B5-82AF-56546CCBA1CD}" type="datetimeFigureOut">
               <a:rPr lang="en-IN" smtClean="0"/>
-              <a:t>04-05-2022</a:t>
+              <a:t>13-05-2022</a:t>
             </a:fld>
             <a:endParaRPr lang="en-IN"/>
           </a:p>
@@ -904,7 +937,7 @@
           <a:p>
             <a:fld id="{39864F90-5D3F-40B5-82AF-56546CCBA1CD}" type="datetimeFigureOut">
               <a:rPr lang="en-IN" smtClean="0"/>
-              <a:t>04-05-2022</a:t>
+              <a:t>13-05-2022</a:t>
             </a:fld>
             <a:endParaRPr lang="en-IN"/>
           </a:p>
@@ -1148,7 +1181,7 @@
           <a:p>
             <a:fld id="{39864F90-5D3F-40B5-82AF-56546CCBA1CD}" type="datetimeFigureOut">
               <a:rPr lang="en-IN" smtClean="0"/>
-              <a:t>04-05-2022</a:t>
+              <a:t>13-05-2022</a:t>
             </a:fld>
             <a:endParaRPr lang="en-IN"/>
           </a:p>
@@ -1380,7 +1413,7 @@
           <a:p>
             <a:fld id="{39864F90-5D3F-40B5-82AF-56546CCBA1CD}" type="datetimeFigureOut">
               <a:rPr lang="en-IN" smtClean="0"/>
-              <a:t>04-05-2022</a:t>
+              <a:t>13-05-2022</a:t>
             </a:fld>
             <a:endParaRPr lang="en-IN"/>
           </a:p>
@@ -1747,7 +1780,7 @@
           <a:p>
             <a:fld id="{39864F90-5D3F-40B5-82AF-56546CCBA1CD}" type="datetimeFigureOut">
               <a:rPr lang="en-IN" smtClean="0"/>
-              <a:t>04-05-2022</a:t>
+              <a:t>13-05-2022</a:t>
             </a:fld>
             <a:endParaRPr lang="en-IN"/>
           </a:p>
@@ -1865,7 +1898,7 @@
           <a:p>
             <a:fld id="{39864F90-5D3F-40B5-82AF-56546CCBA1CD}" type="datetimeFigureOut">
               <a:rPr lang="en-IN" smtClean="0"/>
-              <a:t>04-05-2022</a:t>
+              <a:t>13-05-2022</a:t>
             </a:fld>
             <a:endParaRPr lang="en-IN"/>
           </a:p>
@@ -1960,7 +1993,7 @@
           <a:p>
             <a:fld id="{39864F90-5D3F-40B5-82AF-56546CCBA1CD}" type="datetimeFigureOut">
               <a:rPr lang="en-IN" smtClean="0"/>
-              <a:t>04-05-2022</a:t>
+              <a:t>13-05-2022</a:t>
             </a:fld>
             <a:endParaRPr lang="en-IN"/>
           </a:p>
@@ -2237,7 +2270,7 @@
           <a:p>
             <a:fld id="{39864F90-5D3F-40B5-82AF-56546CCBA1CD}" type="datetimeFigureOut">
               <a:rPr lang="en-IN" smtClean="0"/>
-              <a:t>04-05-2022</a:t>
+              <a:t>13-05-2022</a:t>
             </a:fld>
             <a:endParaRPr lang="en-IN"/>
           </a:p>
@@ -2494,7 +2527,7 @@
           <a:p>
             <a:fld id="{39864F90-5D3F-40B5-82AF-56546CCBA1CD}" type="datetimeFigureOut">
               <a:rPr lang="en-IN" smtClean="0"/>
-              <a:t>04-05-2022</a:t>
+              <a:t>13-05-2022</a:t>
             </a:fld>
             <a:endParaRPr lang="en-IN"/>
           </a:p>
@@ -2707,7 +2740,7 @@
           <a:p>
             <a:fld id="{39864F90-5D3F-40B5-82AF-56546CCBA1CD}" type="datetimeFigureOut">
               <a:rPr lang="en-IN" smtClean="0"/>
-              <a:t>04-05-2022</a:t>
+              <a:t>13-05-2022</a:t>
             </a:fld>
             <a:endParaRPr lang="en-IN"/>
           </a:p>
@@ -10018,8 +10051,8 @@
         </p:nvSpPr>
         <p:spPr>
           <a:xfrm>
-            <a:off x="998738" y="432137"/>
-            <a:ext cx="4478784" cy="4339650"/>
+            <a:off x="439445" y="201317"/>
+            <a:ext cx="7008920" cy="4154984"/>
           </a:xfrm>
           <a:prstGeom prst="rect">
             <a:avLst/>
@@ -10193,7 +10226,7 @@
                 <a:latin typeface="Times New Roman" panose="02020603050405020304" pitchFamily="18" charset="0"/>
                 <a:cs typeface="Times New Roman" panose="02020603050405020304" pitchFamily="18" charset="0"/>
               </a:rPr>
-              <a:t> = new File("C:\\Users\\Makhan\\IdeaProjects\\abc.txt" )</a:t>
+              <a:t> = new File("C:\\Users\\Makhan\\IdeaProjects\\abc.txt1" )</a:t>
             </a:r>
           </a:p>
           <a:p>
@@ -13935,10 +13968,627 @@
           <a:chExt cx="0" cy="0"/>
         </a:xfrm>
       </p:grpSpPr>
+      <p:sp>
+        <p:nvSpPr>
+          <p:cNvPr id="5" name="TextBox 4">
+            <a:extLst>
+              <a:ext uri="{FF2B5EF4-FFF2-40B4-BE49-F238E27FC236}">
+                <a16:creationId xmlns:a16="http://schemas.microsoft.com/office/drawing/2014/main" id="{3038D932-E3B0-0B9E-95E5-E0A3B7823D04}"/>
+              </a:ext>
+            </a:extLst>
+          </p:cNvPr>
+          <p:cNvSpPr txBox="1"/>
+          <p:nvPr/>
+        </p:nvSpPr>
+        <p:spPr>
+          <a:xfrm>
+            <a:off x="403933" y="350329"/>
+            <a:ext cx="8606901" cy="5909310"/>
+          </a:xfrm>
+          <a:prstGeom prst="rect">
+            <a:avLst/>
+          </a:prstGeom>
+          <a:noFill/>
+        </p:spPr>
+        <p:txBody>
+          <a:bodyPr wrap="square">
+            <a:spAutoFit/>
+          </a:bodyPr>
+          <a:lstStyle/>
+          <a:p>
+            <a:pPr algn="l"/>
+            <a:r>
+              <a:rPr lang="en-US" sz="1400" b="1" i="0" dirty="0">
+                <a:solidFill>
+                  <a:srgbClr val="000000"/>
+                </a:solidFill>
+                <a:effectLst/>
+                <a:latin typeface="Segoe UI" panose="020B0502040204020203" pitchFamily="34" charset="0"/>
+              </a:rPr>
+              <a:t>What is Git?</a:t>
+            </a:r>
+          </a:p>
+          <a:p>
+            <a:pPr algn="l"/>
+            <a:r>
+              <a:rPr lang="en-US" sz="1400" b="0" i="0" dirty="0">
+                <a:solidFill>
+                  <a:srgbClr val="000000"/>
+                </a:solidFill>
+                <a:effectLst/>
+                <a:latin typeface="Verdana" panose="020B0604030504040204" pitchFamily="34" charset="0"/>
+              </a:rPr>
+              <a:t>Git is a popular version control system. It was created by Linus Torvalds in 2005, and has been maintained by Junio Hamano since then.</a:t>
+            </a:r>
+          </a:p>
+          <a:p>
+            <a:pPr algn="l"/>
+            <a:r>
+              <a:rPr lang="en-US" sz="1400" b="0" i="0" dirty="0">
+                <a:solidFill>
+                  <a:srgbClr val="000000"/>
+                </a:solidFill>
+                <a:effectLst/>
+                <a:latin typeface="Verdana" panose="020B0604030504040204" pitchFamily="34" charset="0"/>
+              </a:rPr>
+              <a:t>It is used for:</a:t>
+            </a:r>
+          </a:p>
+          <a:p>
+            <a:pPr algn="l">
+              <a:buFont typeface="Arial" panose="020B0604020202020204" pitchFamily="34" charset="0"/>
+              <a:buChar char="•"/>
+            </a:pPr>
+            <a:r>
+              <a:rPr lang="en-US" sz="1400" b="0" i="0" dirty="0">
+                <a:solidFill>
+                  <a:srgbClr val="000000"/>
+                </a:solidFill>
+                <a:effectLst/>
+                <a:latin typeface="Verdana" panose="020B0604030504040204" pitchFamily="34" charset="0"/>
+              </a:rPr>
+              <a:t>Tracking code changes</a:t>
+            </a:r>
+          </a:p>
+          <a:p>
+            <a:pPr algn="l">
+              <a:buFont typeface="Arial" panose="020B0604020202020204" pitchFamily="34" charset="0"/>
+              <a:buChar char="•"/>
+            </a:pPr>
+            <a:r>
+              <a:rPr lang="en-US" sz="1400" b="0" i="0" dirty="0">
+                <a:solidFill>
+                  <a:srgbClr val="000000"/>
+                </a:solidFill>
+                <a:effectLst/>
+                <a:latin typeface="Verdana" panose="020B0604030504040204" pitchFamily="34" charset="0"/>
+              </a:rPr>
+              <a:t>Tracking who made changes</a:t>
+            </a:r>
+          </a:p>
+          <a:p>
+            <a:pPr algn="l">
+              <a:buFont typeface="Arial" panose="020B0604020202020204" pitchFamily="34" charset="0"/>
+              <a:buChar char="•"/>
+            </a:pPr>
+            <a:r>
+              <a:rPr lang="en-US" sz="1400" b="0" i="0" dirty="0">
+                <a:solidFill>
+                  <a:srgbClr val="000000"/>
+                </a:solidFill>
+                <a:effectLst/>
+                <a:latin typeface="Verdana" panose="020B0604030504040204" pitchFamily="34" charset="0"/>
+              </a:rPr>
+              <a:t>Coding collaboration</a:t>
+            </a:r>
+          </a:p>
+          <a:p>
+            <a:pPr algn="l">
+              <a:buFont typeface="Arial" panose="020B0604020202020204" pitchFamily="34" charset="0"/>
+              <a:buChar char="•"/>
+            </a:pPr>
+            <a:endParaRPr lang="en-US" sz="1400" b="0" i="0" dirty="0">
+              <a:solidFill>
+                <a:srgbClr val="000000"/>
+              </a:solidFill>
+              <a:effectLst/>
+              <a:latin typeface="Verdana" panose="020B0604030504040204" pitchFamily="34" charset="0"/>
+            </a:endParaRPr>
+          </a:p>
+          <a:p>
+            <a:pPr algn="l"/>
+            <a:r>
+              <a:rPr lang="en-US" sz="1400" b="1" i="0" dirty="0">
+                <a:solidFill>
+                  <a:srgbClr val="000000"/>
+                </a:solidFill>
+                <a:effectLst/>
+                <a:latin typeface="Segoe UI" panose="020B0502040204020203" pitchFamily="34" charset="0"/>
+              </a:rPr>
+              <a:t>What does Git do?</a:t>
+            </a:r>
+          </a:p>
+          <a:p>
+            <a:pPr algn="l">
+              <a:buFont typeface="Arial" panose="020B0604020202020204" pitchFamily="34" charset="0"/>
+              <a:buChar char="•"/>
+            </a:pPr>
+            <a:r>
+              <a:rPr lang="en-US" sz="1400" b="0" i="0" dirty="0">
+                <a:solidFill>
+                  <a:srgbClr val="000000"/>
+                </a:solidFill>
+                <a:effectLst/>
+                <a:latin typeface="Verdana" panose="020B0604030504040204" pitchFamily="34" charset="0"/>
+              </a:rPr>
+              <a:t>Manage projects with </a:t>
+            </a:r>
+            <a:r>
+              <a:rPr lang="en-US" sz="1400" b="1" i="0" dirty="0">
+                <a:solidFill>
+                  <a:srgbClr val="000000"/>
+                </a:solidFill>
+                <a:effectLst/>
+                <a:latin typeface="Verdana" panose="020B0604030504040204" pitchFamily="34" charset="0"/>
+              </a:rPr>
+              <a:t>Repositories</a:t>
+            </a:r>
+            <a:endParaRPr lang="en-US" sz="1400" b="0" i="0" dirty="0">
+              <a:solidFill>
+                <a:srgbClr val="000000"/>
+              </a:solidFill>
+              <a:effectLst/>
+              <a:latin typeface="Verdana" panose="020B0604030504040204" pitchFamily="34" charset="0"/>
+            </a:endParaRPr>
+          </a:p>
+          <a:p>
+            <a:pPr algn="l">
+              <a:buFont typeface="Arial" panose="020B0604020202020204" pitchFamily="34" charset="0"/>
+              <a:buChar char="•"/>
+            </a:pPr>
+            <a:r>
+              <a:rPr lang="en-US" sz="1400" b="1" i="0" dirty="0">
+                <a:solidFill>
+                  <a:srgbClr val="000000"/>
+                </a:solidFill>
+                <a:effectLst/>
+                <a:latin typeface="Verdana" panose="020B0604030504040204" pitchFamily="34" charset="0"/>
+              </a:rPr>
+              <a:t>Clone</a:t>
+            </a:r>
+            <a:r>
+              <a:rPr lang="en-US" sz="1400" b="0" i="0" dirty="0">
+                <a:solidFill>
+                  <a:srgbClr val="000000"/>
+                </a:solidFill>
+                <a:effectLst/>
+                <a:latin typeface="Verdana" panose="020B0604030504040204" pitchFamily="34" charset="0"/>
+              </a:rPr>
+              <a:t> a project to work on a local copy</a:t>
+            </a:r>
+          </a:p>
+          <a:p>
+            <a:pPr algn="l">
+              <a:buFont typeface="Arial" panose="020B0604020202020204" pitchFamily="34" charset="0"/>
+              <a:buChar char="•"/>
+            </a:pPr>
+            <a:r>
+              <a:rPr lang="en-US" sz="1400" b="0" i="0" dirty="0">
+                <a:solidFill>
+                  <a:srgbClr val="000000"/>
+                </a:solidFill>
+                <a:effectLst/>
+                <a:latin typeface="Verdana" panose="020B0604030504040204" pitchFamily="34" charset="0"/>
+              </a:rPr>
+              <a:t>Control and track changes with </a:t>
+            </a:r>
+            <a:r>
+              <a:rPr lang="en-US" sz="1400" b="1" i="0" dirty="0">
+                <a:solidFill>
+                  <a:srgbClr val="000000"/>
+                </a:solidFill>
+                <a:effectLst/>
+                <a:latin typeface="Verdana" panose="020B0604030504040204" pitchFamily="34" charset="0"/>
+              </a:rPr>
+              <a:t>Staging</a:t>
+            </a:r>
+            <a:r>
+              <a:rPr lang="en-US" sz="1400" b="0" i="0" dirty="0">
+                <a:solidFill>
+                  <a:srgbClr val="000000"/>
+                </a:solidFill>
+                <a:effectLst/>
+                <a:latin typeface="Verdana" panose="020B0604030504040204" pitchFamily="34" charset="0"/>
+              </a:rPr>
+              <a:t> and </a:t>
+            </a:r>
+            <a:r>
+              <a:rPr lang="en-US" sz="1400" b="1" i="0" dirty="0">
+                <a:solidFill>
+                  <a:srgbClr val="000000"/>
+                </a:solidFill>
+                <a:effectLst/>
+                <a:latin typeface="Verdana" panose="020B0604030504040204" pitchFamily="34" charset="0"/>
+              </a:rPr>
+              <a:t>Committing</a:t>
+            </a:r>
+            <a:endParaRPr lang="en-US" sz="1400" b="0" i="0" dirty="0">
+              <a:solidFill>
+                <a:srgbClr val="000000"/>
+              </a:solidFill>
+              <a:effectLst/>
+              <a:latin typeface="Verdana" panose="020B0604030504040204" pitchFamily="34" charset="0"/>
+            </a:endParaRPr>
+          </a:p>
+          <a:p>
+            <a:pPr algn="l">
+              <a:buFont typeface="Arial" panose="020B0604020202020204" pitchFamily="34" charset="0"/>
+              <a:buChar char="•"/>
+            </a:pPr>
+            <a:r>
+              <a:rPr lang="en-US" sz="1400" b="1" i="0" dirty="0">
+                <a:solidFill>
+                  <a:srgbClr val="000000"/>
+                </a:solidFill>
+                <a:effectLst/>
+                <a:latin typeface="Verdana" panose="020B0604030504040204" pitchFamily="34" charset="0"/>
+              </a:rPr>
+              <a:t>Branch</a:t>
+            </a:r>
+            <a:r>
+              <a:rPr lang="en-US" sz="1400" b="0" i="0" dirty="0">
+                <a:solidFill>
+                  <a:srgbClr val="000000"/>
+                </a:solidFill>
+                <a:effectLst/>
+                <a:latin typeface="Verdana" panose="020B0604030504040204" pitchFamily="34" charset="0"/>
+              </a:rPr>
+              <a:t> and </a:t>
+            </a:r>
+            <a:r>
+              <a:rPr lang="en-US" sz="1400" b="1" i="0" dirty="0">
+                <a:solidFill>
+                  <a:srgbClr val="000000"/>
+                </a:solidFill>
+                <a:effectLst/>
+                <a:latin typeface="Verdana" panose="020B0604030504040204" pitchFamily="34" charset="0"/>
+              </a:rPr>
+              <a:t>Merge</a:t>
+            </a:r>
+            <a:r>
+              <a:rPr lang="en-US" sz="1400" b="0" i="0" dirty="0">
+                <a:solidFill>
+                  <a:srgbClr val="000000"/>
+                </a:solidFill>
+                <a:effectLst/>
+                <a:latin typeface="Verdana" panose="020B0604030504040204" pitchFamily="34" charset="0"/>
+              </a:rPr>
+              <a:t> to allow for work on different parts and versions of a project</a:t>
+            </a:r>
+          </a:p>
+          <a:p>
+            <a:pPr algn="l">
+              <a:buFont typeface="Arial" panose="020B0604020202020204" pitchFamily="34" charset="0"/>
+              <a:buChar char="•"/>
+            </a:pPr>
+            <a:r>
+              <a:rPr lang="en-US" sz="1400" b="1" i="0" dirty="0">
+                <a:solidFill>
+                  <a:srgbClr val="000000"/>
+                </a:solidFill>
+                <a:effectLst/>
+                <a:latin typeface="Verdana" panose="020B0604030504040204" pitchFamily="34" charset="0"/>
+              </a:rPr>
+              <a:t>Pull</a:t>
+            </a:r>
+            <a:r>
+              <a:rPr lang="en-US" sz="1400" b="0" i="0" dirty="0">
+                <a:solidFill>
+                  <a:srgbClr val="000000"/>
+                </a:solidFill>
+                <a:effectLst/>
+                <a:latin typeface="Verdana" panose="020B0604030504040204" pitchFamily="34" charset="0"/>
+              </a:rPr>
+              <a:t> the latest version of the project to a local copy</a:t>
+            </a:r>
+          </a:p>
+          <a:p>
+            <a:pPr algn="l">
+              <a:buFont typeface="Arial" panose="020B0604020202020204" pitchFamily="34" charset="0"/>
+              <a:buChar char="•"/>
+            </a:pPr>
+            <a:r>
+              <a:rPr lang="en-US" sz="1400" b="1" i="0" dirty="0">
+                <a:solidFill>
+                  <a:srgbClr val="000000"/>
+                </a:solidFill>
+                <a:effectLst/>
+                <a:latin typeface="Verdana" panose="020B0604030504040204" pitchFamily="34" charset="0"/>
+              </a:rPr>
+              <a:t>Push</a:t>
+            </a:r>
+            <a:r>
+              <a:rPr lang="en-US" sz="1400" b="0" i="0" dirty="0">
+                <a:solidFill>
+                  <a:srgbClr val="000000"/>
+                </a:solidFill>
+                <a:effectLst/>
+                <a:latin typeface="Verdana" panose="020B0604030504040204" pitchFamily="34" charset="0"/>
+              </a:rPr>
+              <a:t> local updates to the main project</a:t>
+            </a:r>
+          </a:p>
+          <a:p>
+            <a:pPr algn="l">
+              <a:buFont typeface="Arial" panose="020B0604020202020204" pitchFamily="34" charset="0"/>
+              <a:buChar char="•"/>
+            </a:pPr>
+            <a:endParaRPr lang="en-US" sz="1400" b="0" i="0" dirty="0">
+              <a:solidFill>
+                <a:srgbClr val="000000"/>
+              </a:solidFill>
+              <a:effectLst/>
+              <a:latin typeface="Verdana" panose="020B0604030504040204" pitchFamily="34" charset="0"/>
+            </a:endParaRPr>
+          </a:p>
+          <a:p>
+            <a:pPr algn="l"/>
+            <a:r>
+              <a:rPr lang="en-US" sz="1400" b="1" i="0" dirty="0">
+                <a:solidFill>
+                  <a:srgbClr val="000000"/>
+                </a:solidFill>
+                <a:effectLst/>
+                <a:latin typeface="Segoe UI" panose="020B0502040204020203" pitchFamily="34" charset="0"/>
+              </a:rPr>
+              <a:t>Working with Git</a:t>
+            </a:r>
+          </a:p>
+          <a:p>
+            <a:pPr algn="l">
+              <a:buFont typeface="Arial" panose="020B0604020202020204" pitchFamily="34" charset="0"/>
+              <a:buChar char="•"/>
+            </a:pPr>
+            <a:r>
+              <a:rPr lang="en-US" sz="1400" b="0" i="0" dirty="0">
+                <a:solidFill>
+                  <a:srgbClr val="000000"/>
+                </a:solidFill>
+                <a:effectLst/>
+                <a:latin typeface="Verdana" panose="020B0604030504040204" pitchFamily="34" charset="0"/>
+              </a:rPr>
+              <a:t>Initialize Git on a folder, making it a </a:t>
+            </a:r>
+            <a:r>
+              <a:rPr lang="en-US" sz="1400" b="1" i="0" dirty="0">
+                <a:solidFill>
+                  <a:srgbClr val="000000"/>
+                </a:solidFill>
+                <a:effectLst/>
+                <a:latin typeface="Verdana" panose="020B0604030504040204" pitchFamily="34" charset="0"/>
+              </a:rPr>
+              <a:t>Repository</a:t>
+            </a:r>
+            <a:endParaRPr lang="en-US" sz="1400" b="0" i="0" dirty="0">
+              <a:solidFill>
+                <a:srgbClr val="000000"/>
+              </a:solidFill>
+              <a:effectLst/>
+              <a:latin typeface="Verdana" panose="020B0604030504040204" pitchFamily="34" charset="0"/>
+            </a:endParaRPr>
+          </a:p>
+          <a:p>
+            <a:pPr algn="l">
+              <a:buFont typeface="Arial" panose="020B0604020202020204" pitchFamily="34" charset="0"/>
+              <a:buChar char="•"/>
+            </a:pPr>
+            <a:r>
+              <a:rPr lang="en-US" sz="1400" b="0" i="0" dirty="0">
+                <a:solidFill>
+                  <a:srgbClr val="000000"/>
+                </a:solidFill>
+                <a:effectLst/>
+                <a:latin typeface="Verdana" panose="020B0604030504040204" pitchFamily="34" charset="0"/>
+              </a:rPr>
+              <a:t>Git now creates a hidden folder to keep track of changes in that folder</a:t>
+            </a:r>
+          </a:p>
+          <a:p>
+            <a:pPr algn="l">
+              <a:buFont typeface="Arial" panose="020B0604020202020204" pitchFamily="34" charset="0"/>
+              <a:buChar char="•"/>
+            </a:pPr>
+            <a:r>
+              <a:rPr lang="en-US" sz="1400" b="0" i="0" dirty="0">
+                <a:solidFill>
+                  <a:srgbClr val="000000"/>
+                </a:solidFill>
+                <a:effectLst/>
+                <a:latin typeface="Verdana" panose="020B0604030504040204" pitchFamily="34" charset="0"/>
+              </a:rPr>
+              <a:t>When a file is changed, added or deleted, it is considered </a:t>
+            </a:r>
+            <a:r>
+              <a:rPr lang="en-US" sz="1400" b="1" i="0" dirty="0">
+                <a:solidFill>
+                  <a:srgbClr val="000000"/>
+                </a:solidFill>
+                <a:effectLst/>
+                <a:latin typeface="Verdana" panose="020B0604030504040204" pitchFamily="34" charset="0"/>
+              </a:rPr>
+              <a:t>modified</a:t>
+            </a:r>
+            <a:endParaRPr lang="en-US" sz="1400" b="0" i="0" dirty="0">
+              <a:solidFill>
+                <a:srgbClr val="000000"/>
+              </a:solidFill>
+              <a:effectLst/>
+              <a:latin typeface="Verdana" panose="020B0604030504040204" pitchFamily="34" charset="0"/>
+            </a:endParaRPr>
+          </a:p>
+          <a:p>
+            <a:pPr algn="l">
+              <a:buFont typeface="Arial" panose="020B0604020202020204" pitchFamily="34" charset="0"/>
+              <a:buChar char="•"/>
+            </a:pPr>
+            <a:r>
+              <a:rPr lang="en-US" sz="1400" b="0" i="0" dirty="0">
+                <a:solidFill>
+                  <a:srgbClr val="000000"/>
+                </a:solidFill>
+                <a:effectLst/>
+                <a:latin typeface="Verdana" panose="020B0604030504040204" pitchFamily="34" charset="0"/>
+              </a:rPr>
+              <a:t>You select the modified files you want to </a:t>
+            </a:r>
+            <a:r>
+              <a:rPr lang="en-US" sz="1400" b="1" i="0" dirty="0">
+                <a:solidFill>
+                  <a:srgbClr val="000000"/>
+                </a:solidFill>
+                <a:effectLst/>
+                <a:latin typeface="Verdana" panose="020B0604030504040204" pitchFamily="34" charset="0"/>
+              </a:rPr>
+              <a:t>Stage</a:t>
+            </a:r>
+            <a:endParaRPr lang="en-US" sz="1400" b="0" i="0" dirty="0">
+              <a:solidFill>
+                <a:srgbClr val="000000"/>
+              </a:solidFill>
+              <a:effectLst/>
+              <a:latin typeface="Verdana" panose="020B0604030504040204" pitchFamily="34" charset="0"/>
+            </a:endParaRPr>
+          </a:p>
+          <a:p>
+            <a:pPr algn="l">
+              <a:buFont typeface="Arial" panose="020B0604020202020204" pitchFamily="34" charset="0"/>
+              <a:buChar char="•"/>
+            </a:pPr>
+            <a:r>
+              <a:rPr lang="en-US" sz="1400" b="0" i="0" dirty="0">
+                <a:solidFill>
+                  <a:srgbClr val="000000"/>
+                </a:solidFill>
+                <a:effectLst/>
+                <a:latin typeface="Verdana" panose="020B0604030504040204" pitchFamily="34" charset="0"/>
+              </a:rPr>
+              <a:t>The </a:t>
+            </a:r>
+            <a:r>
+              <a:rPr lang="en-US" sz="1400" b="1" i="0" dirty="0">
+                <a:solidFill>
+                  <a:srgbClr val="000000"/>
+                </a:solidFill>
+                <a:effectLst/>
+                <a:latin typeface="Verdana" panose="020B0604030504040204" pitchFamily="34" charset="0"/>
+              </a:rPr>
+              <a:t>Staged</a:t>
+            </a:r>
+            <a:r>
+              <a:rPr lang="en-US" sz="1400" b="0" i="0" dirty="0">
+                <a:solidFill>
+                  <a:srgbClr val="000000"/>
+                </a:solidFill>
+                <a:effectLst/>
+                <a:latin typeface="Verdana" panose="020B0604030504040204" pitchFamily="34" charset="0"/>
+              </a:rPr>
+              <a:t> files are </a:t>
+            </a:r>
+            <a:r>
+              <a:rPr lang="en-US" sz="1400" b="1" i="0" dirty="0">
+                <a:solidFill>
+                  <a:srgbClr val="000000"/>
+                </a:solidFill>
+                <a:effectLst/>
+                <a:latin typeface="Verdana" panose="020B0604030504040204" pitchFamily="34" charset="0"/>
+              </a:rPr>
+              <a:t>Committed</a:t>
+            </a:r>
+            <a:r>
+              <a:rPr lang="en-US" sz="1400" b="0" i="0" dirty="0">
+                <a:solidFill>
+                  <a:srgbClr val="000000"/>
+                </a:solidFill>
+                <a:effectLst/>
+                <a:latin typeface="Verdana" panose="020B0604030504040204" pitchFamily="34" charset="0"/>
+              </a:rPr>
+              <a:t>, which prompts Git to store a </a:t>
+            </a:r>
+            <a:r>
+              <a:rPr lang="en-US" sz="1400" b="1" i="0" dirty="0">
+                <a:solidFill>
+                  <a:srgbClr val="000000"/>
+                </a:solidFill>
+                <a:effectLst/>
+                <a:latin typeface="Verdana" panose="020B0604030504040204" pitchFamily="34" charset="0"/>
+              </a:rPr>
+              <a:t>permanent</a:t>
+            </a:r>
+            <a:r>
+              <a:rPr lang="en-US" sz="1400" b="0" i="0" dirty="0">
+                <a:solidFill>
+                  <a:srgbClr val="000000"/>
+                </a:solidFill>
+                <a:effectLst/>
+                <a:latin typeface="Verdana" panose="020B0604030504040204" pitchFamily="34" charset="0"/>
+              </a:rPr>
+              <a:t> snapshot of the files</a:t>
+            </a:r>
+          </a:p>
+          <a:p>
+            <a:pPr algn="l">
+              <a:buFont typeface="Arial" panose="020B0604020202020204" pitchFamily="34" charset="0"/>
+              <a:buChar char="•"/>
+            </a:pPr>
+            <a:r>
+              <a:rPr lang="en-US" sz="1400" b="0" i="0" dirty="0">
+                <a:solidFill>
+                  <a:srgbClr val="000000"/>
+                </a:solidFill>
+                <a:effectLst/>
+                <a:latin typeface="Verdana" panose="020B0604030504040204" pitchFamily="34" charset="0"/>
+              </a:rPr>
+              <a:t>Git allows you to see the full history of every commit.</a:t>
+            </a:r>
+          </a:p>
+          <a:p>
+            <a:pPr algn="l">
+              <a:buFont typeface="Arial" panose="020B0604020202020204" pitchFamily="34" charset="0"/>
+              <a:buChar char="•"/>
+            </a:pPr>
+            <a:r>
+              <a:rPr lang="en-US" sz="1400" b="0" i="0" dirty="0">
+                <a:solidFill>
+                  <a:srgbClr val="000000"/>
+                </a:solidFill>
+                <a:effectLst/>
+                <a:latin typeface="Verdana" panose="020B0604030504040204" pitchFamily="34" charset="0"/>
+              </a:rPr>
+              <a:t>You can revert back to any previous commit.</a:t>
+            </a:r>
+          </a:p>
+          <a:p>
+            <a:pPr algn="l">
+              <a:buFont typeface="Arial" panose="020B0604020202020204" pitchFamily="34" charset="0"/>
+              <a:buChar char="•"/>
+            </a:pPr>
+            <a:r>
+              <a:rPr lang="en-US" sz="1400" b="0" i="0" dirty="0">
+                <a:solidFill>
+                  <a:srgbClr val="000000"/>
+                </a:solidFill>
+                <a:effectLst/>
+                <a:latin typeface="Verdana" panose="020B0604030504040204" pitchFamily="34" charset="0"/>
+              </a:rPr>
+              <a:t>Git does not store a separate copy of every file in every commit, but keeps track of changes made in each commit!</a:t>
+            </a:r>
+          </a:p>
+        </p:txBody>
+      </p:sp>
     </p:spTree>
     <p:extLst>
       <p:ext uri="{BB962C8B-B14F-4D97-AF65-F5344CB8AC3E}">
-        <p14:creationId xmlns:p14="http://schemas.microsoft.com/office/powerpoint/2010/main" val="3127504994"/>
+        <p14:creationId xmlns:p14="http://schemas.microsoft.com/office/powerpoint/2010/main" val="799971169"/>
       </p:ext>
     </p:extLst>
   </p:cSld>
@@ -14352,10 +15002,166 @@
           <a:chExt cx="0" cy="0"/>
         </a:xfrm>
       </p:grpSpPr>
+      <p:sp>
+        <p:nvSpPr>
+          <p:cNvPr id="3" name="TextBox 2">
+            <a:extLst>
+              <a:ext uri="{FF2B5EF4-FFF2-40B4-BE49-F238E27FC236}">
+                <a16:creationId xmlns:a16="http://schemas.microsoft.com/office/drawing/2014/main" id="{D0982E18-EF9B-6051-0B1C-438AEE9323BE}"/>
+              </a:ext>
+            </a:extLst>
+          </p:cNvPr>
+          <p:cNvSpPr txBox="1"/>
+          <p:nvPr/>
+        </p:nvSpPr>
+        <p:spPr>
+          <a:xfrm>
+            <a:off x="412812" y="126869"/>
+            <a:ext cx="8145262" cy="2031325"/>
+          </a:xfrm>
+          <a:prstGeom prst="rect">
+            <a:avLst/>
+          </a:prstGeom>
+          <a:noFill/>
+        </p:spPr>
+        <p:txBody>
+          <a:bodyPr wrap="square">
+            <a:spAutoFit/>
+          </a:bodyPr>
+          <a:lstStyle/>
+          <a:p>
+            <a:pPr algn="l"/>
+            <a:r>
+              <a:rPr lang="en-US" b="0" i="0" dirty="0">
+                <a:solidFill>
+                  <a:srgbClr val="000000"/>
+                </a:solidFill>
+                <a:effectLst/>
+                <a:latin typeface="Segoe UI" panose="020B0502040204020203" pitchFamily="34" charset="0"/>
+              </a:rPr>
+              <a:t>What is GitHub?</a:t>
+            </a:r>
+          </a:p>
+          <a:p>
+            <a:pPr algn="l">
+              <a:buFont typeface="Arial" panose="020B0604020202020204" pitchFamily="34" charset="0"/>
+              <a:buChar char="•"/>
+            </a:pPr>
+            <a:r>
+              <a:rPr lang="en-US" b="0" i="0" dirty="0">
+                <a:solidFill>
+                  <a:srgbClr val="000000"/>
+                </a:solidFill>
+                <a:effectLst/>
+                <a:latin typeface="Verdana" panose="020B0604030504040204" pitchFamily="34" charset="0"/>
+              </a:rPr>
+              <a:t>Git is not the same as GitHub.</a:t>
+            </a:r>
+          </a:p>
+          <a:p>
+            <a:pPr algn="l">
+              <a:buFont typeface="Arial" panose="020B0604020202020204" pitchFamily="34" charset="0"/>
+              <a:buChar char="•"/>
+            </a:pPr>
+            <a:r>
+              <a:rPr lang="en-US" b="0" i="0" dirty="0">
+                <a:solidFill>
+                  <a:srgbClr val="000000"/>
+                </a:solidFill>
+                <a:effectLst/>
+                <a:latin typeface="Verdana" panose="020B0604030504040204" pitchFamily="34" charset="0"/>
+              </a:rPr>
+              <a:t>GitHub makes tools that use Git.</a:t>
+            </a:r>
+          </a:p>
+          <a:p>
+            <a:pPr algn="l">
+              <a:buFont typeface="Arial" panose="020B0604020202020204" pitchFamily="34" charset="0"/>
+              <a:buChar char="•"/>
+            </a:pPr>
+            <a:r>
+              <a:rPr lang="en-US" b="0" i="0" dirty="0">
+                <a:solidFill>
+                  <a:srgbClr val="000000"/>
+                </a:solidFill>
+                <a:effectLst/>
+                <a:latin typeface="Verdana" panose="020B0604030504040204" pitchFamily="34" charset="0"/>
+              </a:rPr>
+              <a:t>GitHub is the largest host of source code in the world, and has been owned by Microsoft since 2018.</a:t>
+            </a:r>
+          </a:p>
+          <a:p>
+            <a:br>
+              <a:rPr lang="en-US" dirty="0"/>
+            </a:br>
+            <a:endParaRPr lang="en-IN" dirty="0"/>
+          </a:p>
+        </p:txBody>
+      </p:sp>
+      <p:sp>
+        <p:nvSpPr>
+          <p:cNvPr id="5" name="TextBox 4">
+            <a:extLst>
+              <a:ext uri="{FF2B5EF4-FFF2-40B4-BE49-F238E27FC236}">
+                <a16:creationId xmlns:a16="http://schemas.microsoft.com/office/drawing/2014/main" id="{3F29E50F-988D-D0FC-B900-42CB4273244A}"/>
+              </a:ext>
+            </a:extLst>
+          </p:cNvPr>
+          <p:cNvSpPr txBox="1"/>
+          <p:nvPr/>
+        </p:nvSpPr>
+        <p:spPr>
+          <a:xfrm>
+            <a:off x="870012" y="2071080"/>
+            <a:ext cx="7266372" cy="2031325"/>
+          </a:xfrm>
+          <a:prstGeom prst="rect">
+            <a:avLst/>
+          </a:prstGeom>
+          <a:noFill/>
+        </p:spPr>
+        <p:txBody>
+          <a:bodyPr wrap="square">
+            <a:spAutoFit/>
+          </a:bodyPr>
+          <a:lstStyle/>
+          <a:p>
+            <a:r>
+              <a:rPr lang="en-US" dirty="0"/>
+              <a:t>Using Git with Command Line</a:t>
+            </a:r>
+          </a:p>
+          <a:p>
+            <a:r>
+              <a:rPr lang="en-US" dirty="0"/>
+              <a:t>To start using Git, we are first going to open up our Command shell.</a:t>
+            </a:r>
+          </a:p>
+          <a:p>
+            <a:endParaRPr lang="en-US" dirty="0"/>
+          </a:p>
+          <a:p>
+            <a:r>
+              <a:rPr lang="en-US" dirty="0"/>
+              <a:t>For Windows, you can use Git bash, which comes included in Git for Windows. For Mac and Linux you can use the built-in terminal.</a:t>
+            </a:r>
+          </a:p>
+          <a:p>
+            <a:endParaRPr lang="en-US" dirty="0"/>
+          </a:p>
+          <a:p>
+            <a:r>
+              <a:rPr lang="en-US" dirty="0"/>
+              <a:t>The first thing we need to do, is to check if Git is properly installed:</a:t>
+            </a:r>
+            <a:endParaRPr lang="en-IN" dirty="0"/>
+          </a:p>
+        </p:txBody>
+      </p:sp>
     </p:spTree>
     <p:extLst>
       <p:ext uri="{BB962C8B-B14F-4D97-AF65-F5344CB8AC3E}">
-        <p14:creationId xmlns:p14="http://schemas.microsoft.com/office/powerpoint/2010/main" val="72962863"/>
+        <p14:creationId xmlns:p14="http://schemas.microsoft.com/office/powerpoint/2010/main" val="3851974745"/>
       </p:ext>
     </p:extLst>
   </p:cSld>
@@ -14385,7 +15191,7 @@
     </p:spTree>
     <p:extLst>
       <p:ext uri="{BB962C8B-B14F-4D97-AF65-F5344CB8AC3E}">
-        <p14:creationId xmlns:p14="http://schemas.microsoft.com/office/powerpoint/2010/main" val="1008006129"/>
+        <p14:creationId xmlns:p14="http://schemas.microsoft.com/office/powerpoint/2010/main" val="106528976"/>
       </p:ext>
     </p:extLst>
   </p:cSld>
@@ -14415,7 +15221,253 @@
     </p:spTree>
     <p:extLst>
       <p:ext uri="{BB962C8B-B14F-4D97-AF65-F5344CB8AC3E}">
-        <p14:creationId xmlns:p14="http://schemas.microsoft.com/office/powerpoint/2010/main" val="936481097"/>
+        <p14:creationId xmlns:p14="http://schemas.microsoft.com/office/powerpoint/2010/main" val="3688476108"/>
+      </p:ext>
+    </p:extLst>
+  </p:cSld>
+  <p:clrMapOvr>
+    <a:masterClrMapping/>
+  </p:clrMapOvr>
+</p:sld>
+</file>
+
+<file path=ppt/slides/slide143.xml><?xml version="1.0" encoding="utf-8"?>
+<p:sld xmlns:a="http://schemas.openxmlformats.org/drawingml/2006/main" xmlns:r="http://schemas.openxmlformats.org/officeDocument/2006/relationships" xmlns:p="http://schemas.openxmlformats.org/presentationml/2006/main">
+  <p:cSld>
+    <p:spTree>
+      <p:nvGrpSpPr>
+        <p:cNvPr id="1" name=""/>
+        <p:cNvGrpSpPr/>
+        <p:nvPr/>
+      </p:nvGrpSpPr>
+      <p:grpSpPr>
+        <a:xfrm>
+          <a:off x="0" y="0"/>
+          <a:ext cx="0" cy="0"/>
+          <a:chOff x="0" y="0"/>
+          <a:chExt cx="0" cy="0"/>
+        </a:xfrm>
+      </p:grpSpPr>
+    </p:spTree>
+    <p:extLst>
+      <p:ext uri="{BB962C8B-B14F-4D97-AF65-F5344CB8AC3E}">
+        <p14:creationId xmlns:p14="http://schemas.microsoft.com/office/powerpoint/2010/main" val="2365473888"/>
+      </p:ext>
+    </p:extLst>
+  </p:cSld>
+  <p:clrMapOvr>
+    <a:masterClrMapping/>
+  </p:clrMapOvr>
+</p:sld>
+</file>
+
+<file path=ppt/slides/slide144.xml><?xml version="1.0" encoding="utf-8"?>
+<p:sld xmlns:a="http://schemas.openxmlformats.org/drawingml/2006/main" xmlns:r="http://schemas.openxmlformats.org/officeDocument/2006/relationships" xmlns:p="http://schemas.openxmlformats.org/presentationml/2006/main">
+  <p:cSld>
+    <p:spTree>
+      <p:nvGrpSpPr>
+        <p:cNvPr id="1" name=""/>
+        <p:cNvGrpSpPr/>
+        <p:nvPr/>
+      </p:nvGrpSpPr>
+      <p:grpSpPr>
+        <a:xfrm>
+          <a:off x="0" y="0"/>
+          <a:ext cx="0" cy="0"/>
+          <a:chOff x="0" y="0"/>
+          <a:chExt cx="0" cy="0"/>
+        </a:xfrm>
+      </p:grpSpPr>
+    </p:spTree>
+    <p:extLst>
+      <p:ext uri="{BB962C8B-B14F-4D97-AF65-F5344CB8AC3E}">
+        <p14:creationId xmlns:p14="http://schemas.microsoft.com/office/powerpoint/2010/main" val="3890742346"/>
+      </p:ext>
+    </p:extLst>
+  </p:cSld>
+  <p:clrMapOvr>
+    <a:masterClrMapping/>
+  </p:clrMapOvr>
+</p:sld>
+</file>
+
+<file path=ppt/slides/slide145.xml><?xml version="1.0" encoding="utf-8"?>
+<p:sld xmlns:a="http://schemas.openxmlformats.org/drawingml/2006/main" xmlns:r="http://schemas.openxmlformats.org/officeDocument/2006/relationships" xmlns:p="http://schemas.openxmlformats.org/presentationml/2006/main">
+  <p:cSld>
+    <p:spTree>
+      <p:nvGrpSpPr>
+        <p:cNvPr id="1" name=""/>
+        <p:cNvGrpSpPr/>
+        <p:nvPr/>
+      </p:nvGrpSpPr>
+      <p:grpSpPr>
+        <a:xfrm>
+          <a:off x="0" y="0"/>
+          <a:ext cx="0" cy="0"/>
+          <a:chOff x="0" y="0"/>
+          <a:chExt cx="0" cy="0"/>
+        </a:xfrm>
+      </p:grpSpPr>
+    </p:spTree>
+    <p:extLst>
+      <p:ext uri="{BB962C8B-B14F-4D97-AF65-F5344CB8AC3E}">
+        <p14:creationId xmlns:p14="http://schemas.microsoft.com/office/powerpoint/2010/main" val="2778155337"/>
+      </p:ext>
+    </p:extLst>
+  </p:cSld>
+  <p:clrMapOvr>
+    <a:masterClrMapping/>
+  </p:clrMapOvr>
+</p:sld>
+</file>
+
+<file path=ppt/slides/slide146.xml><?xml version="1.0" encoding="utf-8"?>
+<p:sld xmlns:a="http://schemas.openxmlformats.org/drawingml/2006/main" xmlns:r="http://schemas.openxmlformats.org/officeDocument/2006/relationships" xmlns:p="http://schemas.openxmlformats.org/presentationml/2006/main">
+  <p:cSld>
+    <p:spTree>
+      <p:nvGrpSpPr>
+        <p:cNvPr id="1" name=""/>
+        <p:cNvGrpSpPr/>
+        <p:nvPr/>
+      </p:nvGrpSpPr>
+      <p:grpSpPr>
+        <a:xfrm>
+          <a:off x="0" y="0"/>
+          <a:ext cx="0" cy="0"/>
+          <a:chOff x="0" y="0"/>
+          <a:chExt cx="0" cy="0"/>
+        </a:xfrm>
+      </p:grpSpPr>
+    </p:spTree>
+    <p:extLst>
+      <p:ext uri="{BB962C8B-B14F-4D97-AF65-F5344CB8AC3E}">
+        <p14:creationId xmlns:p14="http://schemas.microsoft.com/office/powerpoint/2010/main" val="2967841555"/>
+      </p:ext>
+    </p:extLst>
+  </p:cSld>
+  <p:clrMapOvr>
+    <a:masterClrMapping/>
+  </p:clrMapOvr>
+</p:sld>
+</file>
+
+<file path=ppt/slides/slide147.xml><?xml version="1.0" encoding="utf-8"?>
+<p:sld xmlns:a="http://schemas.openxmlformats.org/drawingml/2006/main" xmlns:r="http://schemas.openxmlformats.org/officeDocument/2006/relationships" xmlns:p="http://schemas.openxmlformats.org/presentationml/2006/main">
+  <p:cSld>
+    <p:spTree>
+      <p:nvGrpSpPr>
+        <p:cNvPr id="1" name=""/>
+        <p:cNvGrpSpPr/>
+        <p:nvPr/>
+      </p:nvGrpSpPr>
+      <p:grpSpPr>
+        <a:xfrm>
+          <a:off x="0" y="0"/>
+          <a:ext cx="0" cy="0"/>
+          <a:chOff x="0" y="0"/>
+          <a:chExt cx="0" cy="0"/>
+        </a:xfrm>
+      </p:grpSpPr>
+    </p:spTree>
+    <p:extLst>
+      <p:ext uri="{BB962C8B-B14F-4D97-AF65-F5344CB8AC3E}">
+        <p14:creationId xmlns:p14="http://schemas.microsoft.com/office/powerpoint/2010/main" val="3746282258"/>
+      </p:ext>
+    </p:extLst>
+  </p:cSld>
+  <p:clrMapOvr>
+    <a:masterClrMapping/>
+  </p:clrMapOvr>
+</p:sld>
+</file>
+
+<file path=ppt/slides/slide148.xml><?xml version="1.0" encoding="utf-8"?>
+<p:sld xmlns:a="http://schemas.openxmlformats.org/drawingml/2006/main" xmlns:r="http://schemas.openxmlformats.org/officeDocument/2006/relationships" xmlns:p="http://schemas.openxmlformats.org/presentationml/2006/main">
+  <p:cSld>
+    <p:spTree>
+      <p:nvGrpSpPr>
+        <p:cNvPr id="1" name=""/>
+        <p:cNvGrpSpPr/>
+        <p:nvPr/>
+      </p:nvGrpSpPr>
+      <p:grpSpPr>
+        <a:xfrm>
+          <a:off x="0" y="0"/>
+          <a:ext cx="0" cy="0"/>
+          <a:chOff x="0" y="0"/>
+          <a:chExt cx="0" cy="0"/>
+        </a:xfrm>
+      </p:grpSpPr>
+    </p:spTree>
+    <p:extLst>
+      <p:ext uri="{BB962C8B-B14F-4D97-AF65-F5344CB8AC3E}">
+        <p14:creationId xmlns:p14="http://schemas.microsoft.com/office/powerpoint/2010/main" val="958087658"/>
+      </p:ext>
+    </p:extLst>
+  </p:cSld>
+  <p:clrMapOvr>
+    <a:masterClrMapping/>
+  </p:clrMapOvr>
+</p:sld>
+</file>
+
+<file path=ppt/slides/slide149.xml><?xml version="1.0" encoding="utf-8"?>
+<p:sld xmlns:a="http://schemas.openxmlformats.org/drawingml/2006/main" xmlns:r="http://schemas.openxmlformats.org/officeDocument/2006/relationships" xmlns:p="http://schemas.openxmlformats.org/presentationml/2006/main">
+  <p:cSld>
+    <p:spTree>
+      <p:nvGrpSpPr>
+        <p:cNvPr id="1" name=""/>
+        <p:cNvGrpSpPr/>
+        <p:nvPr/>
+      </p:nvGrpSpPr>
+      <p:grpSpPr>
+        <a:xfrm>
+          <a:off x="0" y="0"/>
+          <a:ext cx="0" cy="0"/>
+          <a:chOff x="0" y="0"/>
+          <a:chExt cx="0" cy="0"/>
+        </a:xfrm>
+      </p:grpSpPr>
+      <p:pic>
+        <p:nvPicPr>
+          <p:cNvPr id="3" name="Picture 2" descr="Diagram&#10;&#10;Description automatically generated">
+            <a:extLst>
+              <a:ext uri="{FF2B5EF4-FFF2-40B4-BE49-F238E27FC236}">
+                <a16:creationId xmlns:a16="http://schemas.microsoft.com/office/drawing/2014/main" id="{E61BA9FC-EF08-9C35-1494-CA93F0905D5A}"/>
+              </a:ext>
+            </a:extLst>
+          </p:cNvPr>
+          <p:cNvPicPr>
+            <a:picLocks noChangeAspect="1"/>
+          </p:cNvPicPr>
+          <p:nvPr/>
+        </p:nvPicPr>
+        <p:blipFill>
+          <a:blip r:embed="rId2">
+            <a:extLst>
+              <a:ext uri="{28A0092B-C50C-407E-A947-70E740481C1C}">
+                <a14:useLocalDpi xmlns:a14="http://schemas.microsoft.com/office/drawing/2010/main" val="0"/>
+              </a:ext>
+            </a:extLst>
+          </a:blip>
+          <a:stretch>
+            <a:fillRect/>
+          </a:stretch>
+        </p:blipFill>
+        <p:spPr>
+          <a:xfrm>
+            <a:off x="76911" y="206601"/>
+            <a:ext cx="6137458" cy="3397734"/>
+          </a:xfrm>
+          <a:prstGeom prst="rect">
+            <a:avLst/>
+          </a:prstGeom>
+        </p:spPr>
+      </p:pic>
+    </p:spTree>
+    <p:extLst>
+      <p:ext uri="{BB962C8B-B14F-4D97-AF65-F5344CB8AC3E}">
+        <p14:creationId xmlns:p14="http://schemas.microsoft.com/office/powerpoint/2010/main" val="1667558220"/>
       </p:ext>
     </p:extLst>
   </p:cSld>
@@ -14805,6 +15857,970 @@
 </p:sld>
 </file>
 
+<file path=ppt/slides/slide150.xml><?xml version="1.0" encoding="utf-8"?>
+<p:sld xmlns:a="http://schemas.openxmlformats.org/drawingml/2006/main" xmlns:r="http://schemas.openxmlformats.org/officeDocument/2006/relationships" xmlns:p="http://schemas.openxmlformats.org/presentationml/2006/main">
+  <p:cSld>
+    <p:spTree>
+      <p:nvGrpSpPr>
+        <p:cNvPr id="1" name=""/>
+        <p:cNvGrpSpPr/>
+        <p:nvPr/>
+      </p:nvGrpSpPr>
+      <p:grpSpPr>
+        <a:xfrm>
+          <a:off x="0" y="0"/>
+          <a:ext cx="0" cy="0"/>
+          <a:chOff x="0" y="0"/>
+          <a:chExt cx="0" cy="0"/>
+        </a:xfrm>
+      </p:grpSpPr>
+      <p:pic>
+        <p:nvPicPr>
+          <p:cNvPr id="3" name="Picture 2" descr="Graphical user interface, text, application&#10;&#10;Description automatically generated">
+            <a:extLst>
+              <a:ext uri="{FF2B5EF4-FFF2-40B4-BE49-F238E27FC236}">
+                <a16:creationId xmlns:a16="http://schemas.microsoft.com/office/drawing/2014/main" id="{B7421206-090F-E4DC-D45C-587807ABC7FF}"/>
+              </a:ext>
+            </a:extLst>
+          </p:cNvPr>
+          <p:cNvPicPr>
+            <a:picLocks noChangeAspect="1"/>
+          </p:cNvPicPr>
+          <p:nvPr/>
+        </p:nvPicPr>
+        <p:blipFill>
+          <a:blip r:embed="rId2">
+            <a:extLst>
+              <a:ext uri="{28A0092B-C50C-407E-A947-70E740481C1C}">
+                <a14:useLocalDpi xmlns:a14="http://schemas.microsoft.com/office/drawing/2010/main" val="0"/>
+              </a:ext>
+            </a:extLst>
+          </a:blip>
+          <a:stretch>
+            <a:fillRect/>
+          </a:stretch>
+        </p:blipFill>
+        <p:spPr>
+          <a:xfrm>
+            <a:off x="721170" y="433452"/>
+            <a:ext cx="7179955" cy="4910906"/>
+          </a:xfrm>
+          <a:prstGeom prst="rect">
+            <a:avLst/>
+          </a:prstGeom>
+        </p:spPr>
+      </p:pic>
+    </p:spTree>
+    <p:extLst>
+      <p:ext uri="{BB962C8B-B14F-4D97-AF65-F5344CB8AC3E}">
+        <p14:creationId xmlns:p14="http://schemas.microsoft.com/office/powerpoint/2010/main" val="167643213"/>
+      </p:ext>
+    </p:extLst>
+  </p:cSld>
+  <p:clrMapOvr>
+    <a:masterClrMapping/>
+  </p:clrMapOvr>
+</p:sld>
+</file>
+
+<file path=ppt/slides/slide151.xml><?xml version="1.0" encoding="utf-8"?>
+<p:sld xmlns:a="http://schemas.openxmlformats.org/drawingml/2006/main" xmlns:r="http://schemas.openxmlformats.org/officeDocument/2006/relationships" xmlns:p="http://schemas.openxmlformats.org/presentationml/2006/main">
+  <p:cSld>
+    <p:spTree>
+      <p:nvGrpSpPr>
+        <p:cNvPr id="1" name=""/>
+        <p:cNvGrpSpPr/>
+        <p:nvPr/>
+      </p:nvGrpSpPr>
+      <p:grpSpPr>
+        <a:xfrm>
+          <a:off x="0" y="0"/>
+          <a:ext cx="0" cy="0"/>
+          <a:chOff x="0" y="0"/>
+          <a:chExt cx="0" cy="0"/>
+        </a:xfrm>
+      </p:grpSpPr>
+      <p:pic>
+        <p:nvPicPr>
+          <p:cNvPr id="3" name="Picture 2" descr="Text&#10;&#10;Description automatically generated">
+            <a:extLst>
+              <a:ext uri="{FF2B5EF4-FFF2-40B4-BE49-F238E27FC236}">
+                <a16:creationId xmlns:a16="http://schemas.microsoft.com/office/drawing/2014/main" id="{274965BD-34BD-465C-CC67-5DE36CF3D760}"/>
+              </a:ext>
+            </a:extLst>
+          </p:cNvPr>
+          <p:cNvPicPr>
+            <a:picLocks noChangeAspect="1"/>
+          </p:cNvPicPr>
+          <p:nvPr/>
+        </p:nvPicPr>
+        <p:blipFill>
+          <a:blip r:embed="rId2">
+            <a:extLst>
+              <a:ext uri="{28A0092B-C50C-407E-A947-70E740481C1C}">
+                <a14:useLocalDpi xmlns:a14="http://schemas.microsoft.com/office/drawing/2010/main" val="0"/>
+              </a:ext>
+            </a:extLst>
+          </a:blip>
+          <a:stretch>
+            <a:fillRect/>
+          </a:stretch>
+        </p:blipFill>
+        <p:spPr>
+          <a:xfrm>
+            <a:off x="0" y="0"/>
+            <a:ext cx="9144000" cy="3361653"/>
+          </a:xfrm>
+          <a:prstGeom prst="rect">
+            <a:avLst/>
+          </a:prstGeom>
+        </p:spPr>
+      </p:pic>
+      <p:pic>
+        <p:nvPicPr>
+          <p:cNvPr id="5" name="Picture 4" descr="Text&#10;&#10;Description automatically generated">
+            <a:extLst>
+              <a:ext uri="{FF2B5EF4-FFF2-40B4-BE49-F238E27FC236}">
+                <a16:creationId xmlns:a16="http://schemas.microsoft.com/office/drawing/2014/main" id="{1DD5FD38-DD96-4673-92BF-83C89B4CA113}"/>
+              </a:ext>
+            </a:extLst>
+          </p:cNvPr>
+          <p:cNvPicPr>
+            <a:picLocks noChangeAspect="1"/>
+          </p:cNvPicPr>
+          <p:nvPr/>
+        </p:nvPicPr>
+        <p:blipFill>
+          <a:blip r:embed="rId3">
+            <a:extLst>
+              <a:ext uri="{28A0092B-C50C-407E-A947-70E740481C1C}">
+                <a14:useLocalDpi xmlns:a14="http://schemas.microsoft.com/office/drawing/2010/main" val="0"/>
+              </a:ext>
+            </a:extLst>
+          </a:blip>
+          <a:stretch>
+            <a:fillRect/>
+          </a:stretch>
+        </p:blipFill>
+        <p:spPr>
+          <a:xfrm>
+            <a:off x="324935" y="4117490"/>
+            <a:ext cx="8819065" cy="1943268"/>
+          </a:xfrm>
+          <a:prstGeom prst="rect">
+            <a:avLst/>
+          </a:prstGeom>
+        </p:spPr>
+      </p:pic>
+    </p:spTree>
+    <p:extLst>
+      <p:ext uri="{BB962C8B-B14F-4D97-AF65-F5344CB8AC3E}">
+        <p14:creationId xmlns:p14="http://schemas.microsoft.com/office/powerpoint/2010/main" val="3127504994"/>
+      </p:ext>
+    </p:extLst>
+  </p:cSld>
+  <p:clrMapOvr>
+    <a:masterClrMapping/>
+  </p:clrMapOvr>
+</p:sld>
+</file>
+
+<file path=ppt/slides/slide152.xml><?xml version="1.0" encoding="utf-8"?>
+<p:sld xmlns:a="http://schemas.openxmlformats.org/drawingml/2006/main" xmlns:r="http://schemas.openxmlformats.org/officeDocument/2006/relationships" xmlns:p="http://schemas.openxmlformats.org/presentationml/2006/main">
+  <p:cSld>
+    <p:spTree>
+      <p:nvGrpSpPr>
+        <p:cNvPr id="1" name=""/>
+        <p:cNvGrpSpPr/>
+        <p:nvPr/>
+      </p:nvGrpSpPr>
+      <p:grpSpPr>
+        <a:xfrm>
+          <a:off x="0" y="0"/>
+          <a:ext cx="0" cy="0"/>
+          <a:chOff x="0" y="0"/>
+          <a:chExt cx="0" cy="0"/>
+        </a:xfrm>
+      </p:grpSpPr>
+      <p:pic>
+        <p:nvPicPr>
+          <p:cNvPr id="3" name="Picture 2" descr="A screenshot of a computer&#10;&#10;Description automatically generated with medium confidence">
+            <a:extLst>
+              <a:ext uri="{FF2B5EF4-FFF2-40B4-BE49-F238E27FC236}">
+                <a16:creationId xmlns:a16="http://schemas.microsoft.com/office/drawing/2014/main" id="{0CBD4EC8-BC76-15D3-B0A2-CF651F397DFC}"/>
+              </a:ext>
+            </a:extLst>
+          </p:cNvPr>
+          <p:cNvPicPr>
+            <a:picLocks noChangeAspect="1"/>
+          </p:cNvPicPr>
+          <p:nvPr/>
+        </p:nvPicPr>
+        <p:blipFill>
+          <a:blip r:embed="rId2">
+            <a:extLst>
+              <a:ext uri="{28A0092B-C50C-407E-A947-70E740481C1C}">
+                <a14:useLocalDpi xmlns:a14="http://schemas.microsoft.com/office/drawing/2010/main" val="0"/>
+              </a:ext>
+            </a:extLst>
+          </a:blip>
+          <a:stretch>
+            <a:fillRect/>
+          </a:stretch>
+        </p:blipFill>
+        <p:spPr>
+          <a:xfrm>
+            <a:off x="267938" y="200709"/>
+            <a:ext cx="8117091" cy="1068798"/>
+          </a:xfrm>
+          <a:prstGeom prst="rect">
+            <a:avLst/>
+          </a:prstGeom>
+        </p:spPr>
+      </p:pic>
+      <p:pic>
+        <p:nvPicPr>
+          <p:cNvPr id="5" name="Picture 4" descr="Text&#10;&#10;Description automatically generated">
+            <a:extLst>
+              <a:ext uri="{FF2B5EF4-FFF2-40B4-BE49-F238E27FC236}">
+                <a16:creationId xmlns:a16="http://schemas.microsoft.com/office/drawing/2014/main" id="{D7B8D897-4FAB-B402-7515-C76F9B2A6634}"/>
+              </a:ext>
+            </a:extLst>
+          </p:cNvPr>
+          <p:cNvPicPr>
+            <a:picLocks noChangeAspect="1"/>
+          </p:cNvPicPr>
+          <p:nvPr/>
+        </p:nvPicPr>
+        <p:blipFill>
+          <a:blip r:embed="rId3">
+            <a:extLst>
+              <a:ext uri="{28A0092B-C50C-407E-A947-70E740481C1C}">
+                <a14:useLocalDpi xmlns:a14="http://schemas.microsoft.com/office/drawing/2010/main" val="0"/>
+              </a:ext>
+            </a:extLst>
+          </a:blip>
+          <a:stretch>
+            <a:fillRect/>
+          </a:stretch>
+        </p:blipFill>
+        <p:spPr>
+          <a:xfrm>
+            <a:off x="267938" y="2620620"/>
+            <a:ext cx="8350026" cy="1986891"/>
+          </a:xfrm>
+          <a:prstGeom prst="rect">
+            <a:avLst/>
+          </a:prstGeom>
+        </p:spPr>
+      </p:pic>
+      <p:pic>
+        <p:nvPicPr>
+          <p:cNvPr id="7" name="Picture 6" descr="Text&#10;&#10;Description automatically generated">
+            <a:extLst>
+              <a:ext uri="{FF2B5EF4-FFF2-40B4-BE49-F238E27FC236}">
+                <a16:creationId xmlns:a16="http://schemas.microsoft.com/office/drawing/2014/main" id="{116060F1-0A9F-A3B5-480C-B76053489C82}"/>
+              </a:ext>
+            </a:extLst>
+          </p:cNvPr>
+          <p:cNvPicPr>
+            <a:picLocks noChangeAspect="1"/>
+          </p:cNvPicPr>
+          <p:nvPr/>
+        </p:nvPicPr>
+        <p:blipFill>
+          <a:blip r:embed="rId4">
+            <a:extLst>
+              <a:ext uri="{28A0092B-C50C-407E-A947-70E740481C1C}">
+                <a14:useLocalDpi xmlns:a14="http://schemas.microsoft.com/office/drawing/2010/main" val="0"/>
+              </a:ext>
+            </a:extLst>
+          </a:blip>
+          <a:stretch>
+            <a:fillRect/>
+          </a:stretch>
+        </p:blipFill>
+        <p:spPr>
+          <a:xfrm>
+            <a:off x="267939" y="4946570"/>
+            <a:ext cx="8350025" cy="1607959"/>
+          </a:xfrm>
+          <a:prstGeom prst="rect">
+            <a:avLst/>
+          </a:prstGeom>
+        </p:spPr>
+      </p:pic>
+    </p:spTree>
+    <p:extLst>
+      <p:ext uri="{BB962C8B-B14F-4D97-AF65-F5344CB8AC3E}">
+        <p14:creationId xmlns:p14="http://schemas.microsoft.com/office/powerpoint/2010/main" val="2908733072"/>
+      </p:ext>
+    </p:extLst>
+  </p:cSld>
+  <p:clrMapOvr>
+    <a:masterClrMapping/>
+  </p:clrMapOvr>
+</p:sld>
+</file>
+
+<file path=ppt/slides/slide153.xml><?xml version="1.0" encoding="utf-8"?>
+<p:sld xmlns:a="http://schemas.openxmlformats.org/drawingml/2006/main" xmlns:r="http://schemas.openxmlformats.org/officeDocument/2006/relationships" xmlns:p="http://schemas.openxmlformats.org/presentationml/2006/main">
+  <p:cSld>
+    <p:spTree>
+      <p:nvGrpSpPr>
+        <p:cNvPr id="1" name=""/>
+        <p:cNvGrpSpPr/>
+        <p:nvPr/>
+      </p:nvGrpSpPr>
+      <p:grpSpPr>
+        <a:xfrm>
+          <a:off x="0" y="0"/>
+          <a:ext cx="0" cy="0"/>
+          <a:chOff x="0" y="0"/>
+          <a:chExt cx="0" cy="0"/>
+        </a:xfrm>
+      </p:grpSpPr>
+      <p:pic>
+        <p:nvPicPr>
+          <p:cNvPr id="3" name="Picture 2" descr="Graphical user interface, application&#10;&#10;Description automatically generated">
+            <a:extLst>
+              <a:ext uri="{FF2B5EF4-FFF2-40B4-BE49-F238E27FC236}">
+                <a16:creationId xmlns:a16="http://schemas.microsoft.com/office/drawing/2014/main" id="{C31A27BC-3A20-2B55-3985-808EE1604A4D}"/>
+              </a:ext>
+            </a:extLst>
+          </p:cNvPr>
+          <p:cNvPicPr>
+            <a:picLocks noChangeAspect="1"/>
+          </p:cNvPicPr>
+          <p:nvPr/>
+        </p:nvPicPr>
+        <p:blipFill>
+          <a:blip r:embed="rId2">
+            <a:extLst>
+              <a:ext uri="{28A0092B-C50C-407E-A947-70E740481C1C}">
+                <a14:useLocalDpi xmlns:a14="http://schemas.microsoft.com/office/drawing/2010/main" val="0"/>
+              </a:ext>
+            </a:extLst>
+          </a:blip>
+          <a:stretch>
+            <a:fillRect/>
+          </a:stretch>
+        </p:blipFill>
+        <p:spPr>
+          <a:xfrm>
+            <a:off x="375137" y="165474"/>
+            <a:ext cx="7239627" cy="3749578"/>
+          </a:xfrm>
+          <a:prstGeom prst="rect">
+            <a:avLst/>
+          </a:prstGeom>
+        </p:spPr>
+      </p:pic>
+    </p:spTree>
+    <p:extLst>
+      <p:ext uri="{BB962C8B-B14F-4D97-AF65-F5344CB8AC3E}">
+        <p14:creationId xmlns:p14="http://schemas.microsoft.com/office/powerpoint/2010/main" val="712679655"/>
+      </p:ext>
+    </p:extLst>
+  </p:cSld>
+  <p:clrMapOvr>
+    <a:masterClrMapping/>
+  </p:clrMapOvr>
+</p:sld>
+</file>
+
+<file path=ppt/slides/slide154.xml><?xml version="1.0" encoding="utf-8"?>
+<p:sld xmlns:a="http://schemas.openxmlformats.org/drawingml/2006/main" xmlns:r="http://schemas.openxmlformats.org/officeDocument/2006/relationships" xmlns:p="http://schemas.openxmlformats.org/presentationml/2006/main">
+  <p:cSld>
+    <p:spTree>
+      <p:nvGrpSpPr>
+        <p:cNvPr id="1" name=""/>
+        <p:cNvGrpSpPr/>
+        <p:nvPr/>
+      </p:nvGrpSpPr>
+      <p:grpSpPr>
+        <a:xfrm>
+          <a:off x="0" y="0"/>
+          <a:ext cx="0" cy="0"/>
+          <a:chOff x="0" y="0"/>
+          <a:chExt cx="0" cy="0"/>
+        </a:xfrm>
+      </p:grpSpPr>
+      <p:pic>
+        <p:nvPicPr>
+          <p:cNvPr id="3" name="Picture 2" descr="Text&#10;&#10;Description automatically generated">
+            <a:extLst>
+              <a:ext uri="{FF2B5EF4-FFF2-40B4-BE49-F238E27FC236}">
+                <a16:creationId xmlns:a16="http://schemas.microsoft.com/office/drawing/2014/main" id="{4150C718-1715-5D5E-E301-D5DB422373EF}"/>
+              </a:ext>
+            </a:extLst>
+          </p:cNvPr>
+          <p:cNvPicPr>
+            <a:picLocks noChangeAspect="1"/>
+          </p:cNvPicPr>
+          <p:nvPr/>
+        </p:nvPicPr>
+        <p:blipFill>
+          <a:blip r:embed="rId2">
+            <a:extLst>
+              <a:ext uri="{28A0092B-C50C-407E-A947-70E740481C1C}">
+                <a14:useLocalDpi xmlns:a14="http://schemas.microsoft.com/office/drawing/2010/main" val="0"/>
+              </a:ext>
+            </a:extLst>
+          </a:blip>
+          <a:stretch>
+            <a:fillRect/>
+          </a:stretch>
+        </p:blipFill>
+        <p:spPr>
+          <a:xfrm>
+            <a:off x="238202" y="130157"/>
+            <a:ext cx="8612835" cy="5372566"/>
+          </a:xfrm>
+          <a:prstGeom prst="rect">
+            <a:avLst/>
+          </a:prstGeom>
+        </p:spPr>
+      </p:pic>
+    </p:spTree>
+    <p:extLst>
+      <p:ext uri="{BB962C8B-B14F-4D97-AF65-F5344CB8AC3E}">
+        <p14:creationId xmlns:p14="http://schemas.microsoft.com/office/powerpoint/2010/main" val="384829018"/>
+      </p:ext>
+    </p:extLst>
+  </p:cSld>
+  <p:clrMapOvr>
+    <a:masterClrMapping/>
+  </p:clrMapOvr>
+</p:sld>
+</file>
+
+<file path=ppt/slides/slide155.xml><?xml version="1.0" encoding="utf-8"?>
+<p:sld xmlns:a="http://schemas.openxmlformats.org/drawingml/2006/main" xmlns:r="http://schemas.openxmlformats.org/officeDocument/2006/relationships" xmlns:p="http://schemas.openxmlformats.org/presentationml/2006/main">
+  <p:cSld>
+    <p:spTree>
+      <p:nvGrpSpPr>
+        <p:cNvPr id="1" name=""/>
+        <p:cNvGrpSpPr/>
+        <p:nvPr/>
+      </p:nvGrpSpPr>
+      <p:grpSpPr>
+        <a:xfrm>
+          <a:off x="0" y="0"/>
+          <a:ext cx="0" cy="0"/>
+          <a:chOff x="0" y="0"/>
+          <a:chExt cx="0" cy="0"/>
+        </a:xfrm>
+      </p:grpSpPr>
+      <p:sp>
+        <p:nvSpPr>
+          <p:cNvPr id="2" name="TextBox 1">
+            <a:extLst>
+              <a:ext uri="{FF2B5EF4-FFF2-40B4-BE49-F238E27FC236}">
+                <a16:creationId xmlns:a16="http://schemas.microsoft.com/office/drawing/2014/main" id="{C54CF5D5-FF97-1B13-EEE6-9086AFBCBFB5}"/>
+              </a:ext>
+            </a:extLst>
+          </p:cNvPr>
+          <p:cNvSpPr txBox="1"/>
+          <p:nvPr/>
+        </p:nvSpPr>
+        <p:spPr>
+          <a:xfrm>
+            <a:off x="683581" y="301841"/>
+            <a:ext cx="6001304" cy="369332"/>
+          </a:xfrm>
+          <a:prstGeom prst="rect">
+            <a:avLst/>
+          </a:prstGeom>
+          <a:noFill/>
+        </p:spPr>
+        <p:txBody>
+          <a:bodyPr wrap="square" rtlCol="0">
+            <a:spAutoFit/>
+          </a:bodyPr>
+          <a:lstStyle/>
+          <a:p>
+            <a:r>
+              <a:rPr lang="en-US" dirty="0"/>
+              <a:t>If you want to track all file with one command </a:t>
+            </a:r>
+            <a:endParaRPr lang="en-IN" dirty="0"/>
+          </a:p>
+        </p:txBody>
+      </p:sp>
+      <p:pic>
+        <p:nvPicPr>
+          <p:cNvPr id="4" name="Picture 3" descr="Text&#10;&#10;Description automatically generated">
+            <a:extLst>
+              <a:ext uri="{FF2B5EF4-FFF2-40B4-BE49-F238E27FC236}">
+                <a16:creationId xmlns:a16="http://schemas.microsoft.com/office/drawing/2014/main" id="{41DDA1A9-04C1-0266-8415-440CE9AF0C40}"/>
+              </a:ext>
+            </a:extLst>
+          </p:cNvPr>
+          <p:cNvPicPr>
+            <a:picLocks noChangeAspect="1"/>
+          </p:cNvPicPr>
+          <p:nvPr/>
+        </p:nvPicPr>
+        <p:blipFill>
+          <a:blip r:embed="rId2">
+            <a:extLst>
+              <a:ext uri="{28A0092B-C50C-407E-A947-70E740481C1C}">
+                <a14:useLocalDpi xmlns:a14="http://schemas.microsoft.com/office/drawing/2010/main" val="0"/>
+              </a:ext>
+            </a:extLst>
+          </a:blip>
+          <a:stretch>
+            <a:fillRect/>
+          </a:stretch>
+        </p:blipFill>
+        <p:spPr>
+          <a:xfrm>
+            <a:off x="559762" y="1100654"/>
+            <a:ext cx="7181566" cy="1531753"/>
+          </a:xfrm>
+          <a:prstGeom prst="rect">
+            <a:avLst/>
+          </a:prstGeom>
+        </p:spPr>
+      </p:pic>
+      <p:pic>
+        <p:nvPicPr>
+          <p:cNvPr id="6" name="Picture 5" descr="Text&#10;&#10;Description automatically generated">
+            <a:extLst>
+              <a:ext uri="{FF2B5EF4-FFF2-40B4-BE49-F238E27FC236}">
+                <a16:creationId xmlns:a16="http://schemas.microsoft.com/office/drawing/2014/main" id="{4A5D3E0B-8105-2A90-6406-91FE17409C50}"/>
+              </a:ext>
+            </a:extLst>
+          </p:cNvPr>
+          <p:cNvPicPr>
+            <a:picLocks noChangeAspect="1"/>
+          </p:cNvPicPr>
+          <p:nvPr/>
+        </p:nvPicPr>
+        <p:blipFill>
+          <a:blip r:embed="rId3">
+            <a:extLst>
+              <a:ext uri="{28A0092B-C50C-407E-A947-70E740481C1C}">
+                <a14:useLocalDpi xmlns:a14="http://schemas.microsoft.com/office/drawing/2010/main" val="0"/>
+              </a:ext>
+            </a:extLst>
+          </a:blip>
+          <a:stretch>
+            <a:fillRect/>
+          </a:stretch>
+        </p:blipFill>
+        <p:spPr>
+          <a:xfrm>
+            <a:off x="487758" y="3600856"/>
+            <a:ext cx="8114704" cy="2568163"/>
+          </a:xfrm>
+          <a:prstGeom prst="rect">
+            <a:avLst/>
+          </a:prstGeom>
+        </p:spPr>
+      </p:pic>
+    </p:spTree>
+    <p:extLst>
+      <p:ext uri="{BB962C8B-B14F-4D97-AF65-F5344CB8AC3E}">
+        <p14:creationId xmlns:p14="http://schemas.microsoft.com/office/powerpoint/2010/main" val="1593242968"/>
+      </p:ext>
+    </p:extLst>
+  </p:cSld>
+  <p:clrMapOvr>
+    <a:masterClrMapping/>
+  </p:clrMapOvr>
+</p:sld>
+</file>
+
+<file path=ppt/slides/slide156.xml><?xml version="1.0" encoding="utf-8"?>
+<p:sld xmlns:a="http://schemas.openxmlformats.org/drawingml/2006/main" xmlns:r="http://schemas.openxmlformats.org/officeDocument/2006/relationships" xmlns:p="http://schemas.openxmlformats.org/presentationml/2006/main">
+  <p:cSld>
+    <p:spTree>
+      <p:nvGrpSpPr>
+        <p:cNvPr id="1" name=""/>
+        <p:cNvGrpSpPr/>
+        <p:nvPr/>
+      </p:nvGrpSpPr>
+      <p:grpSpPr>
+        <a:xfrm>
+          <a:off x="0" y="0"/>
+          <a:ext cx="0" cy="0"/>
+          <a:chOff x="0" y="0"/>
+          <a:chExt cx="0" cy="0"/>
+        </a:xfrm>
+      </p:grpSpPr>
+      <p:pic>
+        <p:nvPicPr>
+          <p:cNvPr id="3" name="Picture 2" descr="Text&#10;&#10;Description automatically generated">
+            <a:extLst>
+              <a:ext uri="{FF2B5EF4-FFF2-40B4-BE49-F238E27FC236}">
+                <a16:creationId xmlns:a16="http://schemas.microsoft.com/office/drawing/2014/main" id="{D311EE55-DAA8-71C8-9A31-DD7BDA181142}"/>
+              </a:ext>
+            </a:extLst>
+          </p:cNvPr>
+          <p:cNvPicPr>
+            <a:picLocks noChangeAspect="1"/>
+          </p:cNvPicPr>
+          <p:nvPr/>
+        </p:nvPicPr>
+        <p:blipFill>
+          <a:blip r:embed="rId2">
+            <a:extLst>
+              <a:ext uri="{28A0092B-C50C-407E-A947-70E740481C1C}">
+                <a14:useLocalDpi xmlns:a14="http://schemas.microsoft.com/office/drawing/2010/main" val="0"/>
+              </a:ext>
+            </a:extLst>
+          </a:blip>
+          <a:stretch>
+            <a:fillRect/>
+          </a:stretch>
+        </p:blipFill>
+        <p:spPr>
+          <a:xfrm>
+            <a:off x="485284" y="298165"/>
+            <a:ext cx="7193900" cy="5072825"/>
+          </a:xfrm>
+          <a:prstGeom prst="rect">
+            <a:avLst/>
+          </a:prstGeom>
+        </p:spPr>
+      </p:pic>
+    </p:spTree>
+    <p:extLst>
+      <p:ext uri="{BB962C8B-B14F-4D97-AF65-F5344CB8AC3E}">
+        <p14:creationId xmlns:p14="http://schemas.microsoft.com/office/powerpoint/2010/main" val="72962863"/>
+      </p:ext>
+    </p:extLst>
+  </p:cSld>
+  <p:clrMapOvr>
+    <a:masterClrMapping/>
+  </p:clrMapOvr>
+</p:sld>
+</file>
+
+<file path=ppt/slides/slide157.xml><?xml version="1.0" encoding="utf-8"?>
+<p:sld xmlns:a="http://schemas.openxmlformats.org/drawingml/2006/main" xmlns:r="http://schemas.openxmlformats.org/officeDocument/2006/relationships" xmlns:p="http://schemas.openxmlformats.org/presentationml/2006/main">
+  <p:cSld>
+    <p:spTree>
+      <p:nvGrpSpPr>
+        <p:cNvPr id="1" name=""/>
+        <p:cNvGrpSpPr/>
+        <p:nvPr/>
+      </p:nvGrpSpPr>
+      <p:grpSpPr>
+        <a:xfrm>
+          <a:off x="0" y="0"/>
+          <a:ext cx="0" cy="0"/>
+          <a:chOff x="0" y="0"/>
+          <a:chExt cx="0" cy="0"/>
+        </a:xfrm>
+      </p:grpSpPr>
+      <p:pic>
+        <p:nvPicPr>
+          <p:cNvPr id="2" name="Picture 1" descr="Text&#10;&#10;Description automatically generated">
+            <a:extLst>
+              <a:ext uri="{FF2B5EF4-FFF2-40B4-BE49-F238E27FC236}">
+                <a16:creationId xmlns:a16="http://schemas.microsoft.com/office/drawing/2014/main" id="{E7EDF478-A1C6-E74E-F8EB-F9C26BF287CA}"/>
+              </a:ext>
+            </a:extLst>
+          </p:cNvPr>
+          <p:cNvPicPr>
+            <a:picLocks noChangeAspect="1"/>
+          </p:cNvPicPr>
+          <p:nvPr/>
+        </p:nvPicPr>
+        <p:blipFill>
+          <a:blip r:embed="rId2">
+            <a:extLst>
+              <a:ext uri="{28A0092B-C50C-407E-A947-70E740481C1C}">
+                <a14:useLocalDpi xmlns:a14="http://schemas.microsoft.com/office/drawing/2010/main" val="0"/>
+              </a:ext>
+            </a:extLst>
+          </a:blip>
+          <a:stretch>
+            <a:fillRect/>
+          </a:stretch>
+        </p:blipFill>
+        <p:spPr>
+          <a:xfrm>
+            <a:off x="625499" y="230819"/>
+            <a:ext cx="7711019" cy="5899212"/>
+          </a:xfrm>
+          <a:prstGeom prst="rect">
+            <a:avLst/>
+          </a:prstGeom>
+        </p:spPr>
+      </p:pic>
+    </p:spTree>
+    <p:extLst>
+      <p:ext uri="{BB962C8B-B14F-4D97-AF65-F5344CB8AC3E}">
+        <p14:creationId xmlns:p14="http://schemas.microsoft.com/office/powerpoint/2010/main" val="1008006129"/>
+      </p:ext>
+    </p:extLst>
+  </p:cSld>
+  <p:clrMapOvr>
+    <a:masterClrMapping/>
+  </p:clrMapOvr>
+</p:sld>
+</file>
+
+<file path=ppt/slides/slide158.xml><?xml version="1.0" encoding="utf-8"?>
+<p:sld xmlns:a="http://schemas.openxmlformats.org/drawingml/2006/main" xmlns:r="http://schemas.openxmlformats.org/officeDocument/2006/relationships" xmlns:p="http://schemas.openxmlformats.org/presentationml/2006/main">
+  <p:cSld>
+    <p:spTree>
+      <p:nvGrpSpPr>
+        <p:cNvPr id="1" name=""/>
+        <p:cNvGrpSpPr/>
+        <p:nvPr/>
+      </p:nvGrpSpPr>
+      <p:grpSpPr>
+        <a:xfrm>
+          <a:off x="0" y="0"/>
+          <a:ext cx="0" cy="0"/>
+          <a:chOff x="0" y="0"/>
+          <a:chExt cx="0" cy="0"/>
+        </a:xfrm>
+      </p:grpSpPr>
+      <p:pic>
+        <p:nvPicPr>
+          <p:cNvPr id="3" name="Picture 2" descr="Text&#10;&#10;Description automatically generated">
+            <a:extLst>
+              <a:ext uri="{FF2B5EF4-FFF2-40B4-BE49-F238E27FC236}">
+                <a16:creationId xmlns:a16="http://schemas.microsoft.com/office/drawing/2014/main" id="{B82594D7-75EB-3584-7FA2-F458E116A958}"/>
+              </a:ext>
+            </a:extLst>
+          </p:cNvPr>
+          <p:cNvPicPr>
+            <a:picLocks noChangeAspect="1"/>
+          </p:cNvPicPr>
+          <p:nvPr/>
+        </p:nvPicPr>
+        <p:blipFill>
+          <a:blip r:embed="rId2">
+            <a:extLst>
+              <a:ext uri="{28A0092B-C50C-407E-A947-70E740481C1C}">
+                <a14:useLocalDpi xmlns:a14="http://schemas.microsoft.com/office/drawing/2010/main" val="0"/>
+              </a:ext>
+            </a:extLst>
+          </a:blip>
+          <a:stretch>
+            <a:fillRect/>
+          </a:stretch>
+        </p:blipFill>
+        <p:spPr>
+          <a:xfrm>
+            <a:off x="346229" y="115411"/>
+            <a:ext cx="8310445" cy="4873839"/>
+          </a:xfrm>
+          <a:prstGeom prst="rect">
+            <a:avLst/>
+          </a:prstGeom>
+        </p:spPr>
+      </p:pic>
+      <p:pic>
+        <p:nvPicPr>
+          <p:cNvPr id="5" name="Picture 4" descr="Text&#10;&#10;Description automatically generated">
+            <a:extLst>
+              <a:ext uri="{FF2B5EF4-FFF2-40B4-BE49-F238E27FC236}">
+                <a16:creationId xmlns:a16="http://schemas.microsoft.com/office/drawing/2014/main" id="{ACF03005-7E92-CC40-1061-A0F3DC56452C}"/>
+              </a:ext>
+            </a:extLst>
+          </p:cNvPr>
+          <p:cNvPicPr>
+            <a:picLocks noChangeAspect="1"/>
+          </p:cNvPicPr>
+          <p:nvPr/>
+        </p:nvPicPr>
+        <p:blipFill>
+          <a:blip r:embed="rId3">
+            <a:extLst>
+              <a:ext uri="{28A0092B-C50C-407E-A947-70E740481C1C}">
+                <a14:useLocalDpi xmlns:a14="http://schemas.microsoft.com/office/drawing/2010/main" val="0"/>
+              </a:ext>
+            </a:extLst>
+          </a:blip>
+          <a:stretch>
+            <a:fillRect/>
+          </a:stretch>
+        </p:blipFill>
+        <p:spPr>
+          <a:xfrm>
+            <a:off x="346229" y="4966975"/>
+            <a:ext cx="8310445" cy="1775614"/>
+          </a:xfrm>
+          <a:prstGeom prst="rect">
+            <a:avLst/>
+          </a:prstGeom>
+        </p:spPr>
+      </p:pic>
+    </p:spTree>
+    <p:extLst>
+      <p:ext uri="{BB962C8B-B14F-4D97-AF65-F5344CB8AC3E}">
+        <p14:creationId xmlns:p14="http://schemas.microsoft.com/office/powerpoint/2010/main" val="936481097"/>
+      </p:ext>
+    </p:extLst>
+  </p:cSld>
+  <p:clrMapOvr>
+    <a:masterClrMapping/>
+  </p:clrMapOvr>
+</p:sld>
+</file>
+
+<file path=ppt/slides/slide159.xml><?xml version="1.0" encoding="utf-8"?>
+<p:sld xmlns:a="http://schemas.openxmlformats.org/drawingml/2006/main" xmlns:r="http://schemas.openxmlformats.org/officeDocument/2006/relationships" xmlns:p="http://schemas.openxmlformats.org/presentationml/2006/main">
+  <p:cSld>
+    <p:spTree>
+      <p:nvGrpSpPr>
+        <p:cNvPr id="1" name=""/>
+        <p:cNvGrpSpPr/>
+        <p:nvPr/>
+      </p:nvGrpSpPr>
+      <p:grpSpPr>
+        <a:xfrm>
+          <a:off x="0" y="0"/>
+          <a:ext cx="0" cy="0"/>
+          <a:chOff x="0" y="0"/>
+          <a:chExt cx="0" cy="0"/>
+        </a:xfrm>
+      </p:grpSpPr>
+      <p:sp>
+        <p:nvSpPr>
+          <p:cNvPr id="2" name="TextBox 1">
+            <a:extLst>
+              <a:ext uri="{FF2B5EF4-FFF2-40B4-BE49-F238E27FC236}">
+                <a16:creationId xmlns:a16="http://schemas.microsoft.com/office/drawing/2014/main" id="{8398564E-8B1B-7746-6476-1BB4B2D23BE6}"/>
+              </a:ext>
+            </a:extLst>
+          </p:cNvPr>
+          <p:cNvSpPr txBox="1"/>
+          <p:nvPr/>
+        </p:nvSpPr>
+        <p:spPr>
+          <a:xfrm>
+            <a:off x="426128" y="159798"/>
+            <a:ext cx="4536490" cy="369332"/>
+          </a:xfrm>
+          <a:prstGeom prst="rect">
+            <a:avLst/>
+          </a:prstGeom>
+          <a:noFill/>
+        </p:spPr>
+        <p:txBody>
+          <a:bodyPr wrap="square" rtlCol="0">
+            <a:spAutoFit/>
+          </a:bodyPr>
+          <a:lstStyle/>
+          <a:p>
+            <a:r>
+              <a:rPr lang="en-US" dirty="0"/>
+              <a:t>No need to fire  remote command like below</a:t>
+            </a:r>
+            <a:endParaRPr lang="en-IN" dirty="0"/>
+          </a:p>
+        </p:txBody>
+      </p:sp>
+      <p:pic>
+        <p:nvPicPr>
+          <p:cNvPr id="4" name="Picture 3">
+            <a:extLst>
+              <a:ext uri="{FF2B5EF4-FFF2-40B4-BE49-F238E27FC236}">
+                <a16:creationId xmlns:a16="http://schemas.microsoft.com/office/drawing/2014/main" id="{B6F4848A-259D-52EE-B600-792D2F40666B}"/>
+              </a:ext>
+            </a:extLst>
+          </p:cNvPr>
+          <p:cNvPicPr>
+            <a:picLocks noChangeAspect="1"/>
+          </p:cNvPicPr>
+          <p:nvPr/>
+        </p:nvPicPr>
+        <p:blipFill>
+          <a:blip r:embed="rId2">
+            <a:extLst>
+              <a:ext uri="{28A0092B-C50C-407E-A947-70E740481C1C}">
+                <a14:useLocalDpi xmlns:a14="http://schemas.microsoft.com/office/drawing/2010/main" val="0"/>
+              </a:ext>
+            </a:extLst>
+          </a:blip>
+          <a:stretch>
+            <a:fillRect/>
+          </a:stretch>
+        </p:blipFill>
+        <p:spPr>
+          <a:xfrm>
+            <a:off x="223314" y="830002"/>
+            <a:ext cx="8601090" cy="688079"/>
+          </a:xfrm>
+          <a:prstGeom prst="rect">
+            <a:avLst/>
+          </a:prstGeom>
+        </p:spPr>
+      </p:pic>
+      <p:sp>
+        <p:nvSpPr>
+          <p:cNvPr id="5" name="TextBox 4">
+            <a:extLst>
+              <a:ext uri="{FF2B5EF4-FFF2-40B4-BE49-F238E27FC236}">
+                <a16:creationId xmlns:a16="http://schemas.microsoft.com/office/drawing/2014/main" id="{4C46069B-BA70-F89A-6AF2-64F181F538DA}"/>
+              </a:ext>
+            </a:extLst>
+          </p:cNvPr>
+          <p:cNvSpPr txBox="1"/>
+          <p:nvPr/>
+        </p:nvSpPr>
+        <p:spPr>
+          <a:xfrm>
+            <a:off x="1162975" y="2752078"/>
+            <a:ext cx="6276512" cy="1200329"/>
+          </a:xfrm>
+          <a:prstGeom prst="rect">
+            <a:avLst/>
+          </a:prstGeom>
+          <a:noFill/>
+        </p:spPr>
+        <p:txBody>
+          <a:bodyPr wrap="square" rtlCol="0">
+            <a:spAutoFit/>
+          </a:bodyPr>
+          <a:lstStyle/>
+          <a:p>
+            <a:r>
+              <a:rPr lang="en-US" dirty="0"/>
+              <a:t>Directly fire push command like</a:t>
+            </a:r>
+          </a:p>
+          <a:p>
+            <a:endParaRPr lang="en-US" dirty="0"/>
+          </a:p>
+          <a:p>
+            <a:r>
+              <a:rPr lang="en-IN" sz="1800" dirty="0">
+                <a:solidFill>
+                  <a:prstClr val="black"/>
+                </a:solidFill>
+                <a:latin typeface="Lucida Console" panose="020B0609040504020204" pitchFamily="49" charset="0"/>
+              </a:rPr>
+              <a:t> git push -u origin master</a:t>
+            </a:r>
+          </a:p>
+          <a:p>
+            <a:endParaRPr lang="en-IN" dirty="0"/>
+          </a:p>
+        </p:txBody>
+      </p:sp>
+    </p:spTree>
+    <p:extLst>
+      <p:ext uri="{BB962C8B-B14F-4D97-AF65-F5344CB8AC3E}">
+        <p14:creationId xmlns:p14="http://schemas.microsoft.com/office/powerpoint/2010/main" val="3555604682"/>
+      </p:ext>
+    </p:extLst>
+  </p:cSld>
+  <p:clrMapOvr>
+    <a:masterClrMapping/>
+  </p:clrMapOvr>
+</p:sld>
+</file>
+
 <file path=ppt/slides/slide16.xml><?xml version="1.0" encoding="utf-8"?>
 <p:sld xmlns:a="http://schemas.openxmlformats.org/drawingml/2006/main" xmlns:r="http://schemas.openxmlformats.org/officeDocument/2006/relationships" xmlns:p="http://schemas.openxmlformats.org/presentationml/2006/main">
   <p:cSld>
@@ -15072,6 +17088,1231 @@
     <p:extLst>
       <p:ext uri="{BB962C8B-B14F-4D97-AF65-F5344CB8AC3E}">
         <p14:creationId xmlns:p14="http://schemas.microsoft.com/office/powerpoint/2010/main" val="3789211993"/>
+      </p:ext>
+    </p:extLst>
+  </p:cSld>
+  <p:clrMapOvr>
+    <a:masterClrMapping/>
+  </p:clrMapOvr>
+</p:sld>
+</file>
+
+<file path=ppt/slides/slide160.xml><?xml version="1.0" encoding="utf-8"?>
+<p:sld xmlns:a="http://schemas.openxmlformats.org/drawingml/2006/main" xmlns:r="http://schemas.openxmlformats.org/officeDocument/2006/relationships" xmlns:p="http://schemas.openxmlformats.org/presentationml/2006/main">
+  <p:cSld>
+    <p:spTree>
+      <p:nvGrpSpPr>
+        <p:cNvPr id="1" name=""/>
+        <p:cNvGrpSpPr/>
+        <p:nvPr/>
+      </p:nvGrpSpPr>
+      <p:grpSpPr>
+        <a:xfrm>
+          <a:off x="0" y="0"/>
+          <a:ext cx="0" cy="0"/>
+          <a:chOff x="0" y="0"/>
+          <a:chExt cx="0" cy="0"/>
+        </a:xfrm>
+      </p:grpSpPr>
+      <p:pic>
+        <p:nvPicPr>
+          <p:cNvPr id="3" name="Picture 2" descr="Text&#10;&#10;Description automatically generated">
+            <a:extLst>
+              <a:ext uri="{FF2B5EF4-FFF2-40B4-BE49-F238E27FC236}">
+                <a16:creationId xmlns:a16="http://schemas.microsoft.com/office/drawing/2014/main" id="{4D3836A0-8B53-EF5D-78D8-FC7CF0FD48F7}"/>
+              </a:ext>
+            </a:extLst>
+          </p:cNvPr>
+          <p:cNvPicPr>
+            <a:picLocks noChangeAspect="1"/>
+          </p:cNvPicPr>
+          <p:nvPr/>
+        </p:nvPicPr>
+        <p:blipFill>
+          <a:blip r:embed="rId2">
+            <a:extLst>
+              <a:ext uri="{28A0092B-C50C-407E-A947-70E740481C1C}">
+                <a14:useLocalDpi xmlns:a14="http://schemas.microsoft.com/office/drawing/2010/main" val="0"/>
+              </a:ext>
+            </a:extLst>
+          </a:blip>
+          <a:stretch>
+            <a:fillRect/>
+          </a:stretch>
+        </p:blipFill>
+        <p:spPr>
+          <a:xfrm>
+            <a:off x="799812" y="1766657"/>
+            <a:ext cx="5361290" cy="2041864"/>
+          </a:xfrm>
+          <a:prstGeom prst="rect">
+            <a:avLst/>
+          </a:prstGeom>
+        </p:spPr>
+      </p:pic>
+      <p:sp>
+        <p:nvSpPr>
+          <p:cNvPr id="4" name="TextBox 3">
+            <a:extLst>
+              <a:ext uri="{FF2B5EF4-FFF2-40B4-BE49-F238E27FC236}">
+                <a16:creationId xmlns:a16="http://schemas.microsoft.com/office/drawing/2014/main" id="{90F59ABA-8CBD-A594-977A-ECB55455EBF7}"/>
+              </a:ext>
+            </a:extLst>
+          </p:cNvPr>
+          <p:cNvSpPr txBox="1"/>
+          <p:nvPr/>
+        </p:nvSpPr>
+        <p:spPr>
+          <a:xfrm>
+            <a:off x="1020931" y="497150"/>
+            <a:ext cx="6054571" cy="369332"/>
+          </a:xfrm>
+          <a:prstGeom prst="rect">
+            <a:avLst/>
+          </a:prstGeom>
+          <a:noFill/>
+        </p:spPr>
+        <p:txBody>
+          <a:bodyPr wrap="square" rtlCol="0">
+            <a:spAutoFit/>
+          </a:bodyPr>
+          <a:lstStyle/>
+          <a:p>
+            <a:r>
+              <a:rPr lang="en-US" dirty="0"/>
+              <a:t>Git log show all Previous commits</a:t>
+            </a:r>
+            <a:endParaRPr lang="en-IN" dirty="0"/>
+          </a:p>
+        </p:txBody>
+      </p:sp>
+    </p:spTree>
+    <p:extLst>
+      <p:ext uri="{BB962C8B-B14F-4D97-AF65-F5344CB8AC3E}">
+        <p14:creationId xmlns:p14="http://schemas.microsoft.com/office/powerpoint/2010/main" val="1323086060"/>
+      </p:ext>
+    </p:extLst>
+  </p:cSld>
+  <p:clrMapOvr>
+    <a:masterClrMapping/>
+  </p:clrMapOvr>
+</p:sld>
+</file>
+
+<file path=ppt/slides/slide161.xml><?xml version="1.0" encoding="utf-8"?>
+<p:sld xmlns:a="http://schemas.openxmlformats.org/drawingml/2006/main" xmlns:r="http://schemas.openxmlformats.org/officeDocument/2006/relationships" xmlns:p="http://schemas.openxmlformats.org/presentationml/2006/main">
+  <p:cSld>
+    <p:spTree>
+      <p:nvGrpSpPr>
+        <p:cNvPr id="1" name=""/>
+        <p:cNvGrpSpPr/>
+        <p:nvPr/>
+      </p:nvGrpSpPr>
+      <p:grpSpPr>
+        <a:xfrm>
+          <a:off x="0" y="0"/>
+          <a:ext cx="0" cy="0"/>
+          <a:chOff x="0" y="0"/>
+          <a:chExt cx="0" cy="0"/>
+        </a:xfrm>
+      </p:grpSpPr>
+      <p:sp>
+        <p:nvSpPr>
+          <p:cNvPr id="3" name="TextBox 2">
+            <a:extLst>
+              <a:ext uri="{FF2B5EF4-FFF2-40B4-BE49-F238E27FC236}">
+                <a16:creationId xmlns:a16="http://schemas.microsoft.com/office/drawing/2014/main" id="{E169D298-C224-7B4E-9F97-94B64F2EBDC3}"/>
+              </a:ext>
+            </a:extLst>
+          </p:cNvPr>
+          <p:cNvSpPr txBox="1"/>
+          <p:nvPr/>
+        </p:nvSpPr>
+        <p:spPr>
+          <a:xfrm>
+            <a:off x="332912" y="750137"/>
+            <a:ext cx="4572000" cy="1200329"/>
+          </a:xfrm>
+          <a:prstGeom prst="rect">
+            <a:avLst/>
+          </a:prstGeom>
+          <a:noFill/>
+        </p:spPr>
+        <p:txBody>
+          <a:bodyPr wrap="square">
+            <a:spAutoFit/>
+          </a:bodyPr>
+          <a:lstStyle/>
+          <a:p>
+            <a:pPr algn="ctr"/>
+            <a:r>
+              <a:rPr lang="en-US" b="1" dirty="0"/>
+              <a:t>How to delete Branch</a:t>
+            </a:r>
+          </a:p>
+          <a:p>
+            <a:r>
+              <a:rPr lang="en-US" dirty="0"/>
+              <a:t>$ git branch -d bug1</a:t>
+            </a:r>
+          </a:p>
+          <a:p>
+            <a:r>
+              <a:rPr lang="en-US" dirty="0"/>
+              <a:t>Deleted branch bug1 (was 37c4b3b).</a:t>
+            </a:r>
+          </a:p>
+          <a:p>
+            <a:endParaRPr lang="en-US" dirty="0"/>
+          </a:p>
+        </p:txBody>
+      </p:sp>
+    </p:spTree>
+    <p:extLst>
+      <p:ext uri="{BB962C8B-B14F-4D97-AF65-F5344CB8AC3E}">
+        <p14:creationId xmlns:p14="http://schemas.microsoft.com/office/powerpoint/2010/main" val="4160632565"/>
+      </p:ext>
+    </p:extLst>
+  </p:cSld>
+  <p:clrMapOvr>
+    <a:masterClrMapping/>
+  </p:clrMapOvr>
+</p:sld>
+</file>
+
+<file path=ppt/slides/slide162.xml><?xml version="1.0" encoding="utf-8"?>
+<p:sld xmlns:a="http://schemas.openxmlformats.org/drawingml/2006/main" xmlns:r="http://schemas.openxmlformats.org/officeDocument/2006/relationships" xmlns:p="http://schemas.openxmlformats.org/presentationml/2006/main">
+  <p:cSld>
+    <p:spTree>
+      <p:nvGrpSpPr>
+        <p:cNvPr id="1" name=""/>
+        <p:cNvGrpSpPr/>
+        <p:nvPr/>
+      </p:nvGrpSpPr>
+      <p:grpSpPr>
+        <a:xfrm>
+          <a:off x="0" y="0"/>
+          <a:ext cx="0" cy="0"/>
+          <a:chOff x="0" y="0"/>
+          <a:chExt cx="0" cy="0"/>
+        </a:xfrm>
+      </p:grpSpPr>
+    </p:spTree>
+    <p:extLst>
+      <p:ext uri="{BB962C8B-B14F-4D97-AF65-F5344CB8AC3E}">
+        <p14:creationId xmlns:p14="http://schemas.microsoft.com/office/powerpoint/2010/main" val="3794324889"/>
+      </p:ext>
+    </p:extLst>
+  </p:cSld>
+  <p:clrMapOvr>
+    <a:masterClrMapping/>
+  </p:clrMapOvr>
+</p:sld>
+</file>
+
+<file path=ppt/slides/slide163.xml><?xml version="1.0" encoding="utf-8"?>
+<p:sld xmlns:a="http://schemas.openxmlformats.org/drawingml/2006/main" xmlns:r="http://schemas.openxmlformats.org/officeDocument/2006/relationships" xmlns:p="http://schemas.openxmlformats.org/presentationml/2006/main">
+  <p:cSld>
+    <p:spTree>
+      <p:nvGrpSpPr>
+        <p:cNvPr id="1" name=""/>
+        <p:cNvGrpSpPr/>
+        <p:nvPr/>
+      </p:nvGrpSpPr>
+      <p:grpSpPr>
+        <a:xfrm>
+          <a:off x="0" y="0"/>
+          <a:ext cx="0" cy="0"/>
+          <a:chOff x="0" y="0"/>
+          <a:chExt cx="0" cy="0"/>
+        </a:xfrm>
+      </p:grpSpPr>
+      <p:sp>
+        <p:nvSpPr>
+          <p:cNvPr id="3" name="TextBox 2">
+            <a:extLst>
+              <a:ext uri="{FF2B5EF4-FFF2-40B4-BE49-F238E27FC236}">
+                <a16:creationId xmlns:a16="http://schemas.microsoft.com/office/drawing/2014/main" id="{2F82C323-5B71-7285-5B29-B4948C74F55E}"/>
+              </a:ext>
+            </a:extLst>
+          </p:cNvPr>
+          <p:cNvSpPr txBox="1"/>
+          <p:nvPr/>
+        </p:nvSpPr>
+        <p:spPr>
+          <a:xfrm>
+            <a:off x="821183" y="228106"/>
+            <a:ext cx="7497193" cy="1477328"/>
+          </a:xfrm>
+          <a:prstGeom prst="rect">
+            <a:avLst/>
+          </a:prstGeom>
+          <a:noFill/>
+        </p:spPr>
+        <p:txBody>
+          <a:bodyPr wrap="square">
+            <a:spAutoFit/>
+          </a:bodyPr>
+          <a:lstStyle/>
+          <a:p>
+            <a:r>
+              <a:rPr lang="en-US" dirty="0"/>
+              <a:t>What is Variance?</a:t>
+            </a:r>
+          </a:p>
+          <a:p>
+            <a:r>
+              <a:rPr lang="en-US" dirty="0"/>
+              <a:t>Variance defines Inheritance relationships of Parameterized Types. Variance is all about Sub-Typing.</a:t>
+            </a:r>
+          </a:p>
+          <a:p>
+            <a:endParaRPr lang="en-US" dirty="0"/>
+          </a:p>
+          <a:p>
+            <a:endParaRPr lang="en-US" dirty="0"/>
+          </a:p>
+        </p:txBody>
+      </p:sp>
+      <p:sp>
+        <p:nvSpPr>
+          <p:cNvPr id="5" name="TextBox 4">
+            <a:extLst>
+              <a:ext uri="{FF2B5EF4-FFF2-40B4-BE49-F238E27FC236}">
+                <a16:creationId xmlns:a16="http://schemas.microsoft.com/office/drawing/2014/main" id="{D3363919-4B7E-E0D4-84DC-490E80B0F82E}"/>
+              </a:ext>
+            </a:extLst>
+          </p:cNvPr>
+          <p:cNvSpPr txBox="1"/>
+          <p:nvPr/>
+        </p:nvSpPr>
+        <p:spPr>
+          <a:xfrm>
+            <a:off x="892205" y="1510074"/>
+            <a:ext cx="6059009" cy="646331"/>
+          </a:xfrm>
+          <a:prstGeom prst="rect">
+            <a:avLst/>
+          </a:prstGeom>
+          <a:noFill/>
+        </p:spPr>
+        <p:txBody>
+          <a:bodyPr wrap="square">
+            <a:spAutoFit/>
+          </a:bodyPr>
+          <a:lstStyle/>
+          <a:p>
+            <a:r>
+              <a:rPr lang="en-US" dirty="0"/>
+              <a:t>Please go through the following image to understand “What is Parameterized Type”.</a:t>
+            </a:r>
+            <a:endParaRPr lang="en-IN" dirty="0"/>
+          </a:p>
+        </p:txBody>
+      </p:sp>
+      <p:pic>
+        <p:nvPicPr>
+          <p:cNvPr id="7" name="Picture 6" descr="Diagram&#10;&#10;Description automatically generated">
+            <a:extLst>
+              <a:ext uri="{FF2B5EF4-FFF2-40B4-BE49-F238E27FC236}">
+                <a16:creationId xmlns:a16="http://schemas.microsoft.com/office/drawing/2014/main" id="{745C2DED-126B-569B-5B5E-47A9432593C6}"/>
+              </a:ext>
+            </a:extLst>
+          </p:cNvPr>
+          <p:cNvPicPr>
+            <a:picLocks noChangeAspect="1"/>
+          </p:cNvPicPr>
+          <p:nvPr/>
+        </p:nvPicPr>
+        <p:blipFill>
+          <a:blip r:embed="rId2">
+            <a:extLst>
+              <a:ext uri="{28A0092B-C50C-407E-A947-70E740481C1C}">
+                <a14:useLocalDpi xmlns:a14="http://schemas.microsoft.com/office/drawing/2010/main" val="0"/>
+              </a:ext>
+            </a:extLst>
+          </a:blip>
+          <a:stretch>
+            <a:fillRect/>
+          </a:stretch>
+        </p:blipFill>
+        <p:spPr>
+          <a:xfrm>
+            <a:off x="3888418" y="2174161"/>
+            <a:ext cx="3746377" cy="2801029"/>
+          </a:xfrm>
+          <a:prstGeom prst="rect">
+            <a:avLst/>
+          </a:prstGeom>
+        </p:spPr>
+      </p:pic>
+      <p:sp>
+        <p:nvSpPr>
+          <p:cNvPr id="9" name="TextBox 8">
+            <a:extLst>
+              <a:ext uri="{FF2B5EF4-FFF2-40B4-BE49-F238E27FC236}">
+                <a16:creationId xmlns:a16="http://schemas.microsoft.com/office/drawing/2014/main" id="{BB74641A-0948-180D-D148-B9497DD85163}"/>
+              </a:ext>
+            </a:extLst>
+          </p:cNvPr>
+          <p:cNvSpPr txBox="1"/>
+          <p:nvPr/>
+        </p:nvSpPr>
+        <p:spPr>
+          <a:xfrm>
+            <a:off x="66583" y="5161621"/>
+            <a:ext cx="7923320" cy="1200329"/>
+          </a:xfrm>
+          <a:prstGeom prst="rect">
+            <a:avLst/>
+          </a:prstGeom>
+          <a:noFill/>
+        </p:spPr>
+        <p:txBody>
+          <a:bodyPr wrap="square">
+            <a:spAutoFit/>
+          </a:bodyPr>
+          <a:lstStyle/>
+          <a:p>
+            <a:r>
+              <a:rPr lang="en-US" dirty="0"/>
+              <a:t>Here T is known as “Type Parameter” and List[T] is known as Generic.</a:t>
+            </a:r>
+          </a:p>
+          <a:p>
+            <a:endParaRPr lang="en-US" dirty="0"/>
+          </a:p>
+          <a:p>
+            <a:r>
+              <a:rPr lang="en-US" dirty="0"/>
+              <a:t>For List[T], if we use List[Int], List[</a:t>
+            </a:r>
+            <a:r>
+              <a:rPr lang="en-US" dirty="0" err="1"/>
+              <a:t>AnyVal</a:t>
+            </a:r>
+            <a:r>
+              <a:rPr lang="en-US" dirty="0"/>
+              <a:t>], etc. then these List[Int] and List[</a:t>
+            </a:r>
+            <a:r>
+              <a:rPr lang="en-US" dirty="0" err="1"/>
+              <a:t>AnyVal</a:t>
+            </a:r>
+            <a:r>
+              <a:rPr lang="en-US" dirty="0"/>
+              <a:t>] are known as “Parameterized Types”</a:t>
+            </a:r>
+            <a:endParaRPr lang="en-IN" dirty="0"/>
+          </a:p>
+        </p:txBody>
+      </p:sp>
+    </p:spTree>
+    <p:extLst>
+      <p:ext uri="{BB962C8B-B14F-4D97-AF65-F5344CB8AC3E}">
+        <p14:creationId xmlns:p14="http://schemas.microsoft.com/office/powerpoint/2010/main" val="2940670871"/>
+      </p:ext>
+    </p:extLst>
+  </p:cSld>
+  <p:clrMapOvr>
+    <a:masterClrMapping/>
+  </p:clrMapOvr>
+</p:sld>
+</file>
+
+<file path=ppt/slides/slide164.xml><?xml version="1.0" encoding="utf-8"?>
+<p:sld xmlns:a="http://schemas.openxmlformats.org/drawingml/2006/main" xmlns:r="http://schemas.openxmlformats.org/officeDocument/2006/relationships" xmlns:p="http://schemas.openxmlformats.org/presentationml/2006/main">
+  <p:cSld>
+    <p:spTree>
+      <p:nvGrpSpPr>
+        <p:cNvPr id="1" name=""/>
+        <p:cNvGrpSpPr/>
+        <p:nvPr/>
+      </p:nvGrpSpPr>
+      <p:grpSpPr>
+        <a:xfrm>
+          <a:off x="0" y="0"/>
+          <a:ext cx="0" cy="0"/>
+          <a:chOff x="0" y="0"/>
+          <a:chExt cx="0" cy="0"/>
+        </a:xfrm>
+      </p:grpSpPr>
+      <p:sp>
+        <p:nvSpPr>
+          <p:cNvPr id="3" name="TextBox 2">
+            <a:extLst>
+              <a:ext uri="{FF2B5EF4-FFF2-40B4-BE49-F238E27FC236}">
+                <a16:creationId xmlns:a16="http://schemas.microsoft.com/office/drawing/2014/main" id="{679DBC67-BC93-03D1-B8A5-2662DF40CE50}"/>
+              </a:ext>
+            </a:extLst>
+          </p:cNvPr>
+          <p:cNvSpPr txBox="1"/>
+          <p:nvPr/>
+        </p:nvSpPr>
+        <p:spPr>
+          <a:xfrm>
+            <a:off x="688020" y="441132"/>
+            <a:ext cx="8189650" cy="2308324"/>
+          </a:xfrm>
+          <a:prstGeom prst="rect">
+            <a:avLst/>
+          </a:prstGeom>
+          <a:noFill/>
+        </p:spPr>
+        <p:txBody>
+          <a:bodyPr wrap="square">
+            <a:spAutoFit/>
+          </a:bodyPr>
+          <a:lstStyle/>
+          <a:p>
+            <a:r>
+              <a:rPr lang="en-US" dirty="0"/>
+              <a:t>Variance defines Inheritance relationship between these Parameterized Types.</a:t>
+            </a:r>
+          </a:p>
+          <a:p>
+            <a:endParaRPr lang="en-US" dirty="0"/>
+          </a:p>
+          <a:p>
+            <a:r>
+              <a:rPr lang="en-US" dirty="0"/>
+              <a:t>Advantage of Variance in Scala</a:t>
+            </a:r>
+          </a:p>
+          <a:p>
+            <a:r>
+              <a:rPr lang="en-US" dirty="0"/>
+              <a:t>The main advantage of Scala Variance is:</a:t>
+            </a:r>
+          </a:p>
+          <a:p>
+            <a:endParaRPr lang="en-US" dirty="0"/>
+          </a:p>
+          <a:p>
+            <a:r>
+              <a:rPr lang="en-US" b="1" dirty="0"/>
+              <a:t>Variance makes Scala collections more Type-Safe.</a:t>
+            </a:r>
+          </a:p>
+          <a:p>
+            <a:r>
+              <a:rPr lang="en-US" b="1" dirty="0"/>
+              <a:t>Variance gives more flexible development.</a:t>
+            </a:r>
+          </a:p>
+          <a:p>
+            <a:r>
+              <a:rPr lang="en-US" b="1" dirty="0"/>
+              <a:t>Scala Variance gives us a technique to develop Reliable Applications.</a:t>
+            </a:r>
+            <a:endParaRPr lang="en-IN" b="1" dirty="0"/>
+          </a:p>
+        </p:txBody>
+      </p:sp>
+      <p:sp>
+        <p:nvSpPr>
+          <p:cNvPr id="5" name="TextBox 4">
+            <a:extLst>
+              <a:ext uri="{FF2B5EF4-FFF2-40B4-BE49-F238E27FC236}">
+                <a16:creationId xmlns:a16="http://schemas.microsoft.com/office/drawing/2014/main" id="{45756088-CA24-6E5E-6945-EA4BC6A82981}"/>
+              </a:ext>
+            </a:extLst>
+          </p:cNvPr>
+          <p:cNvSpPr txBox="1"/>
+          <p:nvPr/>
+        </p:nvSpPr>
+        <p:spPr>
+          <a:xfrm>
+            <a:off x="830062" y="3241180"/>
+            <a:ext cx="7390660" cy="1754326"/>
+          </a:xfrm>
+          <a:prstGeom prst="rect">
+            <a:avLst/>
+          </a:prstGeom>
+          <a:noFill/>
+        </p:spPr>
+        <p:txBody>
+          <a:bodyPr wrap="square">
+            <a:spAutoFit/>
+          </a:bodyPr>
+          <a:lstStyle/>
+          <a:p>
+            <a:r>
+              <a:rPr lang="en-US" dirty="0"/>
+              <a:t>Types of Variance in Scala</a:t>
+            </a:r>
+          </a:p>
+          <a:p>
+            <a:r>
+              <a:rPr lang="en-US" dirty="0"/>
+              <a:t>Scala supports the following three kinds of Variance.</a:t>
+            </a:r>
+          </a:p>
+          <a:p>
+            <a:endParaRPr lang="en-US" dirty="0"/>
+          </a:p>
+          <a:p>
+            <a:r>
+              <a:rPr lang="en-US" dirty="0"/>
+              <a:t>Covariant</a:t>
+            </a:r>
+          </a:p>
+          <a:p>
+            <a:r>
+              <a:rPr lang="en-US" dirty="0"/>
+              <a:t>Invariant</a:t>
+            </a:r>
+          </a:p>
+          <a:p>
+            <a:r>
+              <a:rPr lang="en-US" dirty="0"/>
+              <a:t>Contravariant</a:t>
+            </a:r>
+            <a:endParaRPr lang="en-IN" dirty="0"/>
+          </a:p>
+        </p:txBody>
+      </p:sp>
+      <p:sp>
+        <p:nvSpPr>
+          <p:cNvPr id="7" name="TextBox 6">
+            <a:extLst>
+              <a:ext uri="{FF2B5EF4-FFF2-40B4-BE49-F238E27FC236}">
+                <a16:creationId xmlns:a16="http://schemas.microsoft.com/office/drawing/2014/main" id="{68660475-25FE-FA97-D742-34AF7C8E1CA2}"/>
+              </a:ext>
+            </a:extLst>
+          </p:cNvPr>
+          <p:cNvSpPr txBox="1"/>
+          <p:nvPr/>
+        </p:nvSpPr>
+        <p:spPr>
+          <a:xfrm>
+            <a:off x="1777754" y="5128580"/>
+            <a:ext cx="6638278" cy="1200329"/>
+          </a:xfrm>
+          <a:prstGeom prst="rect">
+            <a:avLst/>
+          </a:prstGeom>
+          <a:noFill/>
+        </p:spPr>
+        <p:txBody>
+          <a:bodyPr wrap="square">
+            <a:spAutoFit/>
+          </a:bodyPr>
+          <a:lstStyle/>
+          <a:p>
+            <a:r>
+              <a:rPr lang="en-US" dirty="0"/>
+              <a:t>We will discuss these three variances in detail in coming sections.</a:t>
+            </a:r>
+          </a:p>
+          <a:p>
+            <a:endParaRPr lang="en-US" dirty="0"/>
+          </a:p>
+          <a:p>
+            <a:r>
+              <a:rPr lang="en-US" dirty="0"/>
+              <a:t>Covariant in Scala</a:t>
+            </a:r>
+          </a:p>
+          <a:p>
+            <a:r>
+              <a:rPr lang="en-US" dirty="0"/>
+              <a:t>If “S” is subtype of “T” then List[S] is </a:t>
+            </a:r>
+            <a:r>
+              <a:rPr lang="en-US" dirty="0" err="1"/>
+              <a:t>is</a:t>
+            </a:r>
+            <a:r>
+              <a:rPr lang="en-US" dirty="0"/>
+              <a:t> a subtype of List[T].</a:t>
+            </a:r>
+            <a:endParaRPr lang="en-IN" dirty="0"/>
+          </a:p>
+        </p:txBody>
+      </p:sp>
+    </p:spTree>
+    <p:extLst>
+      <p:ext uri="{BB962C8B-B14F-4D97-AF65-F5344CB8AC3E}">
+        <p14:creationId xmlns:p14="http://schemas.microsoft.com/office/powerpoint/2010/main" val="1001024376"/>
+      </p:ext>
+    </p:extLst>
+  </p:cSld>
+  <p:clrMapOvr>
+    <a:masterClrMapping/>
+  </p:clrMapOvr>
+</p:sld>
+</file>
+
+<file path=ppt/slides/slide165.xml><?xml version="1.0" encoding="utf-8"?>
+<p:sld xmlns:a="http://schemas.openxmlformats.org/drawingml/2006/main" xmlns:r="http://schemas.openxmlformats.org/officeDocument/2006/relationships" xmlns:p="http://schemas.openxmlformats.org/presentationml/2006/main">
+  <p:cSld>
+    <p:spTree>
+      <p:nvGrpSpPr>
+        <p:cNvPr id="1" name=""/>
+        <p:cNvGrpSpPr/>
+        <p:nvPr/>
+      </p:nvGrpSpPr>
+      <p:grpSpPr>
+        <a:xfrm>
+          <a:off x="0" y="0"/>
+          <a:ext cx="0" cy="0"/>
+          <a:chOff x="0" y="0"/>
+          <a:chExt cx="0" cy="0"/>
+        </a:xfrm>
+      </p:grpSpPr>
+      <p:pic>
+        <p:nvPicPr>
+          <p:cNvPr id="3" name="Picture 2" descr="Diagram&#10;&#10;Description automatically generated">
+            <a:extLst>
+              <a:ext uri="{FF2B5EF4-FFF2-40B4-BE49-F238E27FC236}">
+                <a16:creationId xmlns:a16="http://schemas.microsoft.com/office/drawing/2014/main" id="{F853CBA1-619F-4417-6413-5C60824EE60E}"/>
+              </a:ext>
+            </a:extLst>
+          </p:cNvPr>
+          <p:cNvPicPr>
+            <a:picLocks noChangeAspect="1"/>
+          </p:cNvPicPr>
+          <p:nvPr/>
+        </p:nvPicPr>
+        <p:blipFill>
+          <a:blip r:embed="rId2">
+            <a:extLst>
+              <a:ext uri="{28A0092B-C50C-407E-A947-70E740481C1C}">
+                <a14:useLocalDpi xmlns:a14="http://schemas.microsoft.com/office/drawing/2010/main" val="0"/>
+              </a:ext>
+            </a:extLst>
+          </a:blip>
+          <a:stretch>
+            <a:fillRect/>
+          </a:stretch>
+        </p:blipFill>
+        <p:spPr>
+          <a:xfrm>
+            <a:off x="1463381" y="886425"/>
+            <a:ext cx="3108619" cy="2351821"/>
+          </a:xfrm>
+          <a:prstGeom prst="rect">
+            <a:avLst/>
+          </a:prstGeom>
+        </p:spPr>
+      </p:pic>
+      <p:sp>
+        <p:nvSpPr>
+          <p:cNvPr id="5" name="TextBox 4">
+            <a:extLst>
+              <a:ext uri="{FF2B5EF4-FFF2-40B4-BE49-F238E27FC236}">
+                <a16:creationId xmlns:a16="http://schemas.microsoft.com/office/drawing/2014/main" id="{DF267736-117F-7701-EE6F-657C88200E61}"/>
+              </a:ext>
+            </a:extLst>
+          </p:cNvPr>
+          <p:cNvSpPr txBox="1"/>
+          <p:nvPr/>
+        </p:nvSpPr>
+        <p:spPr>
+          <a:xfrm>
+            <a:off x="1167413" y="3539478"/>
+            <a:ext cx="7035554" cy="1200329"/>
+          </a:xfrm>
+          <a:prstGeom prst="rect">
+            <a:avLst/>
+          </a:prstGeom>
+          <a:noFill/>
+        </p:spPr>
+        <p:txBody>
+          <a:bodyPr wrap="square">
+            <a:spAutoFit/>
+          </a:bodyPr>
+          <a:lstStyle/>
+          <a:p>
+            <a:r>
+              <a:rPr lang="en-IN" dirty="0"/>
+              <a:t>Scala Covariance Syntax:-</a:t>
+            </a:r>
+          </a:p>
+          <a:p>
+            <a:r>
+              <a:rPr lang="en-IN" dirty="0"/>
+              <a:t>To represent Covariance relationship between two Parameterized Types, Scala uses the following syntax:</a:t>
+            </a:r>
+          </a:p>
+          <a:p>
+            <a:r>
+              <a:rPr lang="en-IN" dirty="0"/>
+              <a:t>Prefixing Type Parameter with “+” symbol defines Covariance in Scala.</a:t>
+            </a:r>
+          </a:p>
+        </p:txBody>
+      </p:sp>
+    </p:spTree>
+    <p:extLst>
+      <p:ext uri="{BB962C8B-B14F-4D97-AF65-F5344CB8AC3E}">
+        <p14:creationId xmlns:p14="http://schemas.microsoft.com/office/powerpoint/2010/main" val="888923332"/>
+      </p:ext>
+    </p:extLst>
+  </p:cSld>
+  <p:clrMapOvr>
+    <a:masterClrMapping/>
+  </p:clrMapOvr>
+</p:sld>
+</file>
+
+<file path=ppt/slides/slide166.xml><?xml version="1.0" encoding="utf-8"?>
+<p:sld xmlns:a="http://schemas.openxmlformats.org/drawingml/2006/main" xmlns:r="http://schemas.openxmlformats.org/officeDocument/2006/relationships" xmlns:p="http://schemas.openxmlformats.org/presentationml/2006/main">
+  <p:cSld>
+    <p:spTree>
+      <p:nvGrpSpPr>
+        <p:cNvPr id="1" name=""/>
+        <p:cNvGrpSpPr/>
+        <p:nvPr/>
+      </p:nvGrpSpPr>
+      <p:grpSpPr>
+        <a:xfrm>
+          <a:off x="0" y="0"/>
+          <a:ext cx="0" cy="0"/>
+          <a:chOff x="0" y="0"/>
+          <a:chExt cx="0" cy="0"/>
+        </a:xfrm>
+      </p:grpSpPr>
+      <p:sp>
+        <p:nvSpPr>
+          <p:cNvPr id="3" name="TextBox 2">
+            <a:extLst>
+              <a:ext uri="{FF2B5EF4-FFF2-40B4-BE49-F238E27FC236}">
+                <a16:creationId xmlns:a16="http://schemas.microsoft.com/office/drawing/2014/main" id="{2EC4D8A9-8501-DC1D-5646-0A9A3DDAF70A}"/>
+              </a:ext>
+            </a:extLst>
+          </p:cNvPr>
+          <p:cNvSpPr txBox="1"/>
+          <p:nvPr/>
+        </p:nvSpPr>
+        <p:spPr>
+          <a:xfrm>
+            <a:off x="892204" y="540421"/>
+            <a:ext cx="5837069" cy="4893647"/>
+          </a:xfrm>
+          <a:prstGeom prst="rect">
+            <a:avLst/>
+          </a:prstGeom>
+          <a:noFill/>
+        </p:spPr>
+        <p:txBody>
+          <a:bodyPr wrap="square">
+            <a:spAutoFit/>
+          </a:bodyPr>
+          <a:lstStyle/>
+          <a:p>
+            <a:r>
+              <a:rPr lang="en-IN" sz="1200" dirty="0"/>
+              <a:t>Example:-</a:t>
+            </a:r>
+          </a:p>
+          <a:p>
+            <a:r>
+              <a:rPr lang="en-IN" sz="1200" dirty="0"/>
+              <a:t>Write a Scala program to demo Scala Covariant </a:t>
+            </a:r>
+            <a:r>
+              <a:rPr lang="en-IN" sz="1200" dirty="0" err="1"/>
+              <a:t>SubTyping</a:t>
+            </a:r>
+            <a:r>
+              <a:rPr lang="en-IN" sz="1200" dirty="0"/>
+              <a:t> technique.</a:t>
+            </a:r>
+          </a:p>
+          <a:p>
+            <a:endParaRPr lang="en-IN" sz="1200" dirty="0"/>
+          </a:p>
+          <a:p>
+            <a:endParaRPr lang="en-IN" sz="1200" dirty="0"/>
+          </a:p>
+          <a:p>
+            <a:r>
+              <a:rPr lang="en-IN" sz="1200" dirty="0"/>
+              <a:t>class Animal[+T](</a:t>
+            </a:r>
+            <a:r>
+              <a:rPr lang="en-IN" sz="1200" dirty="0" err="1"/>
+              <a:t>val</a:t>
+            </a:r>
+            <a:r>
+              <a:rPr lang="en-IN" sz="1200" dirty="0"/>
+              <a:t> </a:t>
+            </a:r>
+            <a:r>
+              <a:rPr lang="en-IN" sz="1200" dirty="0" err="1"/>
+              <a:t>animial:T</a:t>
+            </a:r>
+            <a:r>
+              <a:rPr lang="en-IN" sz="1200" dirty="0"/>
+              <a:t>)</a:t>
+            </a:r>
+          </a:p>
+          <a:p>
+            <a:endParaRPr lang="en-IN" sz="1200" dirty="0"/>
+          </a:p>
+          <a:p>
+            <a:r>
+              <a:rPr lang="en-IN" sz="1200" dirty="0"/>
+              <a:t>class Dog</a:t>
+            </a:r>
+          </a:p>
+          <a:p>
+            <a:r>
+              <a:rPr lang="en-IN" sz="1200" dirty="0"/>
+              <a:t>class Puppy extends Dog</a:t>
+            </a:r>
+          </a:p>
+          <a:p>
+            <a:endParaRPr lang="en-IN" sz="1200" dirty="0"/>
+          </a:p>
+          <a:p>
+            <a:r>
+              <a:rPr lang="en-IN" sz="1200" dirty="0"/>
+              <a:t>class </a:t>
+            </a:r>
+            <a:r>
+              <a:rPr lang="en-IN" sz="1200" dirty="0" err="1"/>
+              <a:t>AnimalCarer</a:t>
+            </a:r>
+            <a:r>
+              <a:rPr lang="en-IN" sz="1200" dirty="0"/>
+              <a:t>(</a:t>
+            </a:r>
+            <a:r>
+              <a:rPr lang="en-IN" sz="1200" dirty="0" err="1"/>
+              <a:t>val</a:t>
+            </a:r>
+            <a:r>
+              <a:rPr lang="en-IN" sz="1200" dirty="0"/>
+              <a:t> </a:t>
+            </a:r>
+            <a:r>
+              <a:rPr lang="en-IN" sz="1200" dirty="0" err="1"/>
+              <a:t>dog:Animal</a:t>
+            </a:r>
+            <a:r>
+              <a:rPr lang="en-IN" sz="1200" dirty="0"/>
+              <a:t>[Dog])</a:t>
+            </a:r>
+          </a:p>
+          <a:p>
+            <a:endParaRPr lang="en-IN" sz="1200" dirty="0"/>
+          </a:p>
+          <a:p>
+            <a:r>
+              <a:rPr lang="en-IN" sz="1200" dirty="0"/>
+              <a:t>object </a:t>
+            </a:r>
+            <a:r>
+              <a:rPr lang="en-IN" sz="1200" dirty="0" err="1"/>
+              <a:t>ScalaCovarianceTest</a:t>
+            </a:r>
+            <a:r>
+              <a:rPr lang="en-IN" sz="1200" dirty="0"/>
+              <a:t>{</a:t>
+            </a:r>
+          </a:p>
+          <a:p>
+            <a:r>
+              <a:rPr lang="en-IN" sz="1200" dirty="0"/>
+              <a:t>  def main(</a:t>
+            </a:r>
+            <a:r>
+              <a:rPr lang="en-IN" sz="1200" dirty="0" err="1"/>
+              <a:t>args</a:t>
+            </a:r>
+            <a:r>
+              <a:rPr lang="en-IN" sz="1200" dirty="0"/>
+              <a:t>: Array[String]) </a:t>
+            </a:r>
+          </a:p>
+          <a:p>
+            <a:r>
+              <a:rPr lang="en-IN" sz="1200" dirty="0"/>
+              <a:t>{</a:t>
+            </a:r>
+          </a:p>
+          <a:p>
+            <a:r>
+              <a:rPr lang="en-IN" sz="1200" dirty="0"/>
+              <a:t>    </a:t>
+            </a:r>
+            <a:r>
+              <a:rPr lang="en-IN" sz="1200" dirty="0" err="1"/>
+              <a:t>val</a:t>
+            </a:r>
+            <a:r>
+              <a:rPr lang="en-IN" sz="1200" dirty="0"/>
+              <a:t> puppy = new Puppy</a:t>
+            </a:r>
+          </a:p>
+          <a:p>
+            <a:r>
+              <a:rPr lang="en-IN" sz="1200" dirty="0"/>
+              <a:t>    </a:t>
+            </a:r>
+            <a:r>
+              <a:rPr lang="en-IN" sz="1200" dirty="0" err="1"/>
+              <a:t>val</a:t>
+            </a:r>
+            <a:r>
+              <a:rPr lang="en-IN" sz="1200" dirty="0"/>
+              <a:t> dog = new Dog</a:t>
+            </a:r>
+          </a:p>
+          <a:p>
+            <a:endParaRPr lang="en-IN" sz="1200" dirty="0"/>
+          </a:p>
+          <a:p>
+            <a:r>
+              <a:rPr lang="en-IN" sz="1200" dirty="0"/>
+              <a:t>    </a:t>
+            </a:r>
+            <a:r>
+              <a:rPr lang="en-IN" sz="1200" dirty="0" err="1"/>
+              <a:t>val</a:t>
+            </a:r>
+            <a:r>
+              <a:rPr lang="en-IN" sz="1200" dirty="0"/>
+              <a:t> </a:t>
+            </a:r>
+            <a:r>
+              <a:rPr lang="en-IN" sz="1200" dirty="0" err="1"/>
+              <a:t>puppyAnimal:Animal</a:t>
+            </a:r>
+            <a:r>
+              <a:rPr lang="en-IN" sz="1200" dirty="0"/>
+              <a:t>[Puppy] = new Animal[Puppy](puppy)</a:t>
+            </a:r>
+          </a:p>
+          <a:p>
+            <a:r>
+              <a:rPr lang="en-IN" sz="1200" dirty="0"/>
+              <a:t>    </a:t>
+            </a:r>
+            <a:r>
+              <a:rPr lang="en-IN" sz="1200" dirty="0" err="1"/>
+              <a:t>val</a:t>
+            </a:r>
+            <a:r>
+              <a:rPr lang="en-IN" sz="1200" dirty="0"/>
+              <a:t> </a:t>
+            </a:r>
+            <a:r>
+              <a:rPr lang="en-IN" sz="1200" dirty="0" err="1"/>
+              <a:t>dogAnimal:Animal</a:t>
+            </a:r>
+            <a:r>
+              <a:rPr lang="en-IN" sz="1200" dirty="0"/>
+              <a:t>[Dog] = new Animal[Dog](dog)</a:t>
+            </a:r>
+          </a:p>
+          <a:p>
+            <a:endParaRPr lang="en-IN" sz="1200" dirty="0"/>
+          </a:p>
+          <a:p>
+            <a:r>
+              <a:rPr lang="en-IN" sz="1200" dirty="0"/>
+              <a:t>    </a:t>
+            </a:r>
+            <a:r>
+              <a:rPr lang="en-IN" sz="1200" dirty="0" err="1"/>
+              <a:t>val</a:t>
+            </a:r>
+            <a:r>
+              <a:rPr lang="en-IN" sz="1200" dirty="0"/>
+              <a:t> </a:t>
+            </a:r>
+            <a:r>
+              <a:rPr lang="en-IN" sz="1200" dirty="0" err="1"/>
+              <a:t>dogCarer</a:t>
+            </a:r>
+            <a:r>
+              <a:rPr lang="en-IN" sz="1200" dirty="0"/>
+              <a:t> = new </a:t>
+            </a:r>
+            <a:r>
+              <a:rPr lang="en-IN" sz="1200" dirty="0" err="1"/>
+              <a:t>AnimalCarer</a:t>
+            </a:r>
+            <a:r>
+              <a:rPr lang="en-IN" sz="1200" dirty="0"/>
+              <a:t>(</a:t>
+            </a:r>
+            <a:r>
+              <a:rPr lang="en-IN" sz="1200" dirty="0" err="1"/>
+              <a:t>dogAnimal</a:t>
+            </a:r>
+            <a:r>
+              <a:rPr lang="en-IN" sz="1200" dirty="0"/>
+              <a:t>)</a:t>
+            </a:r>
+          </a:p>
+          <a:p>
+            <a:r>
+              <a:rPr lang="en-IN" sz="1200" dirty="0"/>
+              <a:t>    </a:t>
+            </a:r>
+            <a:r>
+              <a:rPr lang="en-IN" sz="1200" dirty="0" err="1"/>
+              <a:t>val</a:t>
+            </a:r>
+            <a:r>
+              <a:rPr lang="en-IN" sz="1200" dirty="0"/>
+              <a:t> </a:t>
+            </a:r>
+            <a:r>
+              <a:rPr lang="en-IN" sz="1200" dirty="0" err="1"/>
+              <a:t>puppyCarer</a:t>
+            </a:r>
+            <a:r>
+              <a:rPr lang="en-IN" sz="1200" dirty="0"/>
+              <a:t> = new </a:t>
+            </a:r>
+            <a:r>
+              <a:rPr lang="en-IN" sz="1200" dirty="0" err="1"/>
+              <a:t>AnimalCarer</a:t>
+            </a:r>
+            <a:r>
+              <a:rPr lang="en-IN" sz="1200" dirty="0"/>
+              <a:t>(</a:t>
+            </a:r>
+            <a:r>
+              <a:rPr lang="en-IN" sz="1200" dirty="0" err="1"/>
+              <a:t>puppyAnimal</a:t>
+            </a:r>
+            <a:r>
+              <a:rPr lang="en-IN" sz="1200" dirty="0"/>
+              <a:t>)</a:t>
+            </a:r>
+          </a:p>
+          <a:p>
+            <a:endParaRPr lang="en-IN" sz="1200" dirty="0"/>
+          </a:p>
+          <a:p>
+            <a:r>
+              <a:rPr lang="en-IN" sz="1200" dirty="0"/>
+              <a:t>    </a:t>
+            </a:r>
+            <a:r>
+              <a:rPr lang="en-IN" sz="1200" dirty="0" err="1"/>
+              <a:t>println</a:t>
+            </a:r>
+            <a:r>
+              <a:rPr lang="en-IN" sz="1200" dirty="0"/>
+              <a:t>("Done.")</a:t>
+            </a:r>
+          </a:p>
+          <a:p>
+            <a:r>
+              <a:rPr lang="en-IN" sz="1200" dirty="0"/>
+              <a:t>  }</a:t>
+            </a:r>
+          </a:p>
+          <a:p>
+            <a:r>
+              <a:rPr lang="en-IN" sz="1200" dirty="0"/>
+              <a:t>}</a:t>
+            </a:r>
+          </a:p>
+        </p:txBody>
+      </p:sp>
+    </p:spTree>
+    <p:extLst>
+      <p:ext uri="{BB962C8B-B14F-4D97-AF65-F5344CB8AC3E}">
+        <p14:creationId xmlns:p14="http://schemas.microsoft.com/office/powerpoint/2010/main" val="1689506702"/>
+      </p:ext>
+    </p:extLst>
+  </p:cSld>
+  <p:clrMapOvr>
+    <a:masterClrMapping/>
+  </p:clrMapOvr>
+</p:sld>
+</file>
+
+<file path=ppt/slides/slide167.xml><?xml version="1.0" encoding="utf-8"?>
+<p:sld xmlns:a="http://schemas.openxmlformats.org/drawingml/2006/main" xmlns:r="http://schemas.openxmlformats.org/officeDocument/2006/relationships" xmlns:p="http://schemas.openxmlformats.org/presentationml/2006/main">
+  <p:cSld>
+    <p:spTree>
+      <p:nvGrpSpPr>
+        <p:cNvPr id="1" name=""/>
+        <p:cNvGrpSpPr/>
+        <p:nvPr/>
+      </p:nvGrpSpPr>
+      <p:grpSpPr>
+        <a:xfrm>
+          <a:off x="0" y="0"/>
+          <a:ext cx="0" cy="0"/>
+          <a:chOff x="0" y="0"/>
+          <a:chExt cx="0" cy="0"/>
+        </a:xfrm>
+      </p:grpSpPr>
+    </p:spTree>
+    <p:extLst>
+      <p:ext uri="{BB962C8B-B14F-4D97-AF65-F5344CB8AC3E}">
+        <p14:creationId xmlns:p14="http://schemas.microsoft.com/office/powerpoint/2010/main" val="2020116337"/>
+      </p:ext>
+    </p:extLst>
+  </p:cSld>
+  <p:clrMapOvr>
+    <a:masterClrMapping/>
+  </p:clrMapOvr>
+</p:sld>
+</file>
+
+<file path=ppt/slides/slide168.xml><?xml version="1.0" encoding="utf-8"?>
+<p:sld xmlns:a="http://schemas.openxmlformats.org/drawingml/2006/main" xmlns:r="http://schemas.openxmlformats.org/officeDocument/2006/relationships" xmlns:p="http://schemas.openxmlformats.org/presentationml/2006/main">
+  <p:cSld>
+    <p:spTree>
+      <p:nvGrpSpPr>
+        <p:cNvPr id="1" name=""/>
+        <p:cNvGrpSpPr/>
+        <p:nvPr/>
+      </p:nvGrpSpPr>
+      <p:grpSpPr>
+        <a:xfrm>
+          <a:off x="0" y="0"/>
+          <a:ext cx="0" cy="0"/>
+          <a:chOff x="0" y="0"/>
+          <a:chExt cx="0" cy="0"/>
+        </a:xfrm>
+      </p:grpSpPr>
+    </p:spTree>
+    <p:extLst>
+      <p:ext uri="{BB962C8B-B14F-4D97-AF65-F5344CB8AC3E}">
+        <p14:creationId xmlns:p14="http://schemas.microsoft.com/office/powerpoint/2010/main" val="1592780577"/>
+      </p:ext>
+    </p:extLst>
+  </p:cSld>
+  <p:clrMapOvr>
+    <a:masterClrMapping/>
+  </p:clrMapOvr>
+</p:sld>
+</file>
+
+<file path=ppt/slides/slide169.xml><?xml version="1.0" encoding="utf-8"?>
+<p:sld xmlns:a="http://schemas.openxmlformats.org/drawingml/2006/main" xmlns:r="http://schemas.openxmlformats.org/officeDocument/2006/relationships" xmlns:p="http://schemas.openxmlformats.org/presentationml/2006/main">
+  <p:cSld>
+    <p:spTree>
+      <p:nvGrpSpPr>
+        <p:cNvPr id="1" name=""/>
+        <p:cNvGrpSpPr/>
+        <p:nvPr/>
+      </p:nvGrpSpPr>
+      <p:grpSpPr>
+        <a:xfrm>
+          <a:off x="0" y="0"/>
+          <a:ext cx="0" cy="0"/>
+          <a:chOff x="0" y="0"/>
+          <a:chExt cx="0" cy="0"/>
+        </a:xfrm>
+      </p:grpSpPr>
+    </p:spTree>
+    <p:extLst>
+      <p:ext uri="{BB962C8B-B14F-4D97-AF65-F5344CB8AC3E}">
+        <p14:creationId xmlns:p14="http://schemas.microsoft.com/office/powerpoint/2010/main" val="1857639849"/>
       </p:ext>
     </p:extLst>
   </p:cSld>
@@ -15299,6 +18540,186 @@
     <p:extLst>
       <p:ext uri="{BB962C8B-B14F-4D97-AF65-F5344CB8AC3E}">
         <p14:creationId xmlns:p14="http://schemas.microsoft.com/office/powerpoint/2010/main" val="2321474113"/>
+      </p:ext>
+    </p:extLst>
+  </p:cSld>
+  <p:clrMapOvr>
+    <a:masterClrMapping/>
+  </p:clrMapOvr>
+</p:sld>
+</file>
+
+<file path=ppt/slides/slide170.xml><?xml version="1.0" encoding="utf-8"?>
+<p:sld xmlns:a="http://schemas.openxmlformats.org/drawingml/2006/main" xmlns:r="http://schemas.openxmlformats.org/officeDocument/2006/relationships" xmlns:p="http://schemas.openxmlformats.org/presentationml/2006/main">
+  <p:cSld>
+    <p:spTree>
+      <p:nvGrpSpPr>
+        <p:cNvPr id="1" name=""/>
+        <p:cNvGrpSpPr/>
+        <p:nvPr/>
+      </p:nvGrpSpPr>
+      <p:grpSpPr>
+        <a:xfrm>
+          <a:off x="0" y="0"/>
+          <a:ext cx="0" cy="0"/>
+          <a:chOff x="0" y="0"/>
+          <a:chExt cx="0" cy="0"/>
+        </a:xfrm>
+      </p:grpSpPr>
+    </p:spTree>
+    <p:extLst>
+      <p:ext uri="{BB962C8B-B14F-4D97-AF65-F5344CB8AC3E}">
+        <p14:creationId xmlns:p14="http://schemas.microsoft.com/office/powerpoint/2010/main" val="2103853812"/>
+      </p:ext>
+    </p:extLst>
+  </p:cSld>
+  <p:clrMapOvr>
+    <a:masterClrMapping/>
+  </p:clrMapOvr>
+</p:sld>
+</file>
+
+<file path=ppt/slides/slide171.xml><?xml version="1.0" encoding="utf-8"?>
+<p:sld xmlns:a="http://schemas.openxmlformats.org/drawingml/2006/main" xmlns:r="http://schemas.openxmlformats.org/officeDocument/2006/relationships" xmlns:p="http://schemas.openxmlformats.org/presentationml/2006/main">
+  <p:cSld>
+    <p:spTree>
+      <p:nvGrpSpPr>
+        <p:cNvPr id="1" name=""/>
+        <p:cNvGrpSpPr/>
+        <p:nvPr/>
+      </p:nvGrpSpPr>
+      <p:grpSpPr>
+        <a:xfrm>
+          <a:off x="0" y="0"/>
+          <a:ext cx="0" cy="0"/>
+          <a:chOff x="0" y="0"/>
+          <a:chExt cx="0" cy="0"/>
+        </a:xfrm>
+      </p:grpSpPr>
+    </p:spTree>
+    <p:extLst>
+      <p:ext uri="{BB962C8B-B14F-4D97-AF65-F5344CB8AC3E}">
+        <p14:creationId xmlns:p14="http://schemas.microsoft.com/office/powerpoint/2010/main" val="1042105178"/>
+      </p:ext>
+    </p:extLst>
+  </p:cSld>
+  <p:clrMapOvr>
+    <a:masterClrMapping/>
+  </p:clrMapOvr>
+</p:sld>
+</file>
+
+<file path=ppt/slides/slide172.xml><?xml version="1.0" encoding="utf-8"?>
+<p:sld xmlns:a="http://schemas.openxmlformats.org/drawingml/2006/main" xmlns:r="http://schemas.openxmlformats.org/officeDocument/2006/relationships" xmlns:p="http://schemas.openxmlformats.org/presentationml/2006/main">
+  <p:cSld>
+    <p:spTree>
+      <p:nvGrpSpPr>
+        <p:cNvPr id="1" name=""/>
+        <p:cNvGrpSpPr/>
+        <p:nvPr/>
+      </p:nvGrpSpPr>
+      <p:grpSpPr>
+        <a:xfrm>
+          <a:off x="0" y="0"/>
+          <a:ext cx="0" cy="0"/>
+          <a:chOff x="0" y="0"/>
+          <a:chExt cx="0" cy="0"/>
+        </a:xfrm>
+      </p:grpSpPr>
+    </p:spTree>
+    <p:extLst>
+      <p:ext uri="{BB962C8B-B14F-4D97-AF65-F5344CB8AC3E}">
+        <p14:creationId xmlns:p14="http://schemas.microsoft.com/office/powerpoint/2010/main" val="3074587196"/>
+      </p:ext>
+    </p:extLst>
+  </p:cSld>
+  <p:clrMapOvr>
+    <a:masterClrMapping/>
+  </p:clrMapOvr>
+</p:sld>
+</file>
+
+<file path=ppt/slides/slide173.xml><?xml version="1.0" encoding="utf-8"?>
+<p:sld xmlns:a="http://schemas.openxmlformats.org/drawingml/2006/main" xmlns:r="http://schemas.openxmlformats.org/officeDocument/2006/relationships" xmlns:p="http://schemas.openxmlformats.org/presentationml/2006/main">
+  <p:cSld>
+    <p:spTree>
+      <p:nvGrpSpPr>
+        <p:cNvPr id="1" name=""/>
+        <p:cNvGrpSpPr/>
+        <p:nvPr/>
+      </p:nvGrpSpPr>
+      <p:grpSpPr>
+        <a:xfrm>
+          <a:off x="0" y="0"/>
+          <a:ext cx="0" cy="0"/>
+          <a:chOff x="0" y="0"/>
+          <a:chExt cx="0" cy="0"/>
+        </a:xfrm>
+      </p:grpSpPr>
+    </p:spTree>
+    <p:extLst>
+      <p:ext uri="{BB962C8B-B14F-4D97-AF65-F5344CB8AC3E}">
+        <p14:creationId xmlns:p14="http://schemas.microsoft.com/office/powerpoint/2010/main" val="1840503752"/>
+      </p:ext>
+    </p:extLst>
+  </p:cSld>
+  <p:clrMapOvr>
+    <a:masterClrMapping/>
+  </p:clrMapOvr>
+</p:sld>
+</file>
+
+<file path=ppt/slides/slide174.xml><?xml version="1.0" encoding="utf-8"?>
+<p:sld xmlns:a="http://schemas.openxmlformats.org/drawingml/2006/main" xmlns:r="http://schemas.openxmlformats.org/officeDocument/2006/relationships" xmlns:p="http://schemas.openxmlformats.org/presentationml/2006/main">
+  <p:cSld>
+    <p:spTree>
+      <p:nvGrpSpPr>
+        <p:cNvPr id="1" name=""/>
+        <p:cNvGrpSpPr/>
+        <p:nvPr/>
+      </p:nvGrpSpPr>
+      <p:grpSpPr>
+        <a:xfrm>
+          <a:off x="0" y="0"/>
+          <a:ext cx="0" cy="0"/>
+          <a:chOff x="0" y="0"/>
+          <a:chExt cx="0" cy="0"/>
+        </a:xfrm>
+      </p:grpSpPr>
+    </p:spTree>
+    <p:extLst>
+      <p:ext uri="{BB962C8B-B14F-4D97-AF65-F5344CB8AC3E}">
+        <p14:creationId xmlns:p14="http://schemas.microsoft.com/office/powerpoint/2010/main" val="359073699"/>
+      </p:ext>
+    </p:extLst>
+  </p:cSld>
+  <p:clrMapOvr>
+    <a:masterClrMapping/>
+  </p:clrMapOvr>
+</p:sld>
+</file>
+
+<file path=ppt/slides/slide175.xml><?xml version="1.0" encoding="utf-8"?>
+<p:sld xmlns:a="http://schemas.openxmlformats.org/drawingml/2006/main" xmlns:r="http://schemas.openxmlformats.org/officeDocument/2006/relationships" xmlns:p="http://schemas.openxmlformats.org/presentationml/2006/main">
+  <p:cSld>
+    <p:spTree>
+      <p:nvGrpSpPr>
+        <p:cNvPr id="1" name=""/>
+        <p:cNvGrpSpPr/>
+        <p:nvPr/>
+      </p:nvGrpSpPr>
+      <p:grpSpPr>
+        <a:xfrm>
+          <a:off x="0" y="0"/>
+          <a:ext cx="0" cy="0"/>
+          <a:chOff x="0" y="0"/>
+          <a:chExt cx="0" cy="0"/>
+        </a:xfrm>
+      </p:grpSpPr>
+    </p:spTree>
+    <p:extLst>
+      <p:ext uri="{BB962C8B-B14F-4D97-AF65-F5344CB8AC3E}">
+        <p14:creationId xmlns:p14="http://schemas.microsoft.com/office/powerpoint/2010/main" val="1568027783"/>
       </p:ext>
     </p:extLst>
   </p:cSld>

</xml_diff>